<commit_message>
updated sldies, added sample code
</commit_message>
<xml_diff>
--- a/slides.pptx
+++ b/slides.pptx
@@ -2722,7 +2722,7 @@
         <p:spPr>
           <a:xfrm>
             <a:off x="0" y="0"/>
-            <a:ext cx="10084680" cy="5668920"/>
+            <a:ext cx="10083600" cy="5667840"/>
           </a:xfrm>
           <a:prstGeom prst="rect">
             <a:avLst/>
@@ -2996,7 +2996,7 @@
         <p:spPr>
           <a:xfrm>
             <a:off x="0" y="0"/>
-            <a:ext cx="10084680" cy="5668920"/>
+            <a:ext cx="10083600" cy="5667840"/>
           </a:xfrm>
           <a:prstGeom prst="rect">
             <a:avLst/>
@@ -3266,7 +3266,7 @@
         <p:spPr>
           <a:xfrm>
             <a:off x="1501200" y="216000"/>
-            <a:ext cx="8098920" cy="934920"/>
+            <a:ext cx="8097840" cy="933840"/>
           </a:xfrm>
           <a:prstGeom prst="rect">
             <a:avLst/>
@@ -3292,7 +3292,7 @@
         <p:spPr>
           <a:xfrm>
             <a:off x="1620000" y="1368000"/>
-            <a:ext cx="8098920" cy="3287160"/>
+            <a:ext cx="8097840" cy="3286080"/>
           </a:xfrm>
           <a:prstGeom prst="rect">
             <a:avLst/>
@@ -3450,7 +3450,7 @@
         <p:spPr>
           <a:xfrm>
             <a:off x="1620000" y="216000"/>
-            <a:ext cx="8098920" cy="934920"/>
+            <a:ext cx="8097840" cy="933840"/>
           </a:xfrm>
           <a:prstGeom prst="rect">
             <a:avLst/>
@@ -3484,7 +3484,7 @@
                 <a:latin typeface="Times New Roman"/>
                 <a:ea typeface="DejaVu Sans"/>
               </a:rPr>
-              <a:t>Advanced Features</a:t>
+              <a:t>Other Features</a:t>
             </a:r>
             <a:endParaRPr b="0" lang="en-US" sz="3300" spc="-1" strike="noStrike">
               <a:latin typeface="Arial"/>
@@ -3501,7 +3501,7 @@
         <p:spPr>
           <a:xfrm>
             <a:off x="1620000" y="1368000"/>
-            <a:ext cx="8098920" cy="3287160"/>
+            <a:ext cx="8097840" cy="3286080"/>
           </a:xfrm>
           <a:prstGeom prst="rect">
             <a:avLst/>
@@ -3522,7 +3522,7 @@
             <a:normAutofit/>
           </a:bodyPr>
           <a:p>
-            <a:pPr marL="432000" indent="-322920">
+            <a:pPr marL="432000" indent="-321840">
               <a:lnSpc>
                 <a:spcPct val="100000"/>
               </a:lnSpc>
@@ -3537,7 +3537,7 @@
               <a:buChar char=""/>
             </a:pPr>
             <a:r>
-              <a:rPr b="0" lang="en-US" sz="2400" spc="-1" strike="noStrike">
+              <a:rPr b="1" lang="en-US" sz="2400" spc="-1" strike="noStrike">
                 <a:solidFill>
                   <a:srgbClr val="050505"/>
                 </a:solidFill>
@@ -3551,7 +3551,7 @@
             </a:endParaRPr>
           </a:p>
           <a:p>
-            <a:pPr marL="432000" indent="-322920">
+            <a:pPr marL="432000" indent="-321840">
               <a:lnSpc>
                 <a:spcPct val="100000"/>
               </a:lnSpc>
@@ -3565,12 +3565,32 @@
               <a:buFont typeface="Wingdings" charset="2"/>
               <a:buChar char=""/>
             </a:pPr>
+            <a:r>
+              <a:rPr b="1" lang="en-US" sz="2400" spc="-1" strike="noStrike">
+                <a:solidFill>
+                  <a:srgbClr val="050505"/>
+                </a:solidFill>
+                <a:latin typeface="Arial"/>
+                <a:ea typeface="DejaVu Sans"/>
+              </a:rPr>
+              <a:t>Templating</a:t>
+            </a:r>
+            <a:r>
+              <a:rPr b="0" lang="en-US" sz="2400" spc="-1" strike="noStrike">
+                <a:solidFill>
+                  <a:srgbClr val="050505"/>
+                </a:solidFill>
+                <a:latin typeface="Arial"/>
+                <a:ea typeface="DejaVu Sans"/>
+              </a:rPr>
+              <a:t> (customize CSS of HTML documentation)</a:t>
+            </a:r>
             <a:endParaRPr b="0" lang="en-US" sz="2400" spc="-1" strike="noStrike">
               <a:latin typeface="Arial"/>
             </a:endParaRPr>
           </a:p>
           <a:p>
-            <a:pPr marL="432000" indent="-322920">
+            <a:pPr marL="432000" indent="-321840">
               <a:lnSpc>
                 <a:spcPct val="100000"/>
               </a:lnSpc>
@@ -3585,6 +3605,16 @@
               <a:buChar char=""/>
             </a:pPr>
             <a:r>
+              <a:rPr b="1" lang="en-US" sz="2400" spc="-1" strike="noStrike">
+                <a:solidFill>
+                  <a:srgbClr val="050505"/>
+                </a:solidFill>
+                <a:latin typeface="Arial"/>
+                <a:ea typeface="DejaVu Sans"/>
+              </a:rPr>
+              <a:t>Generating documentation</a:t>
+            </a:r>
+            <a:r>
               <a:rPr b="0" lang="en-US" sz="2400" spc="-1" strike="noStrike">
                 <a:solidFill>
                   <a:srgbClr val="050505"/>
@@ -3592,14 +3622,14 @@
                 <a:latin typeface="Arial"/>
                 <a:ea typeface="DejaVu Sans"/>
               </a:rPr>
-              <a:t>Generating documentation (like document.js)</a:t>
+              <a:t> (like document.js)</a:t>
             </a:r>
             <a:endParaRPr b="0" lang="en-US" sz="2400" spc="-1" strike="noStrike">
               <a:latin typeface="Arial"/>
             </a:endParaRPr>
           </a:p>
           <a:p>
-            <a:pPr marL="432000" indent="-322920">
+            <a:pPr marL="432000" indent="-321840">
               <a:lnSpc>
                 <a:spcPct val="100000"/>
               </a:lnSpc>
@@ -3613,12 +3643,22 @@
               <a:buFont typeface="Wingdings" charset="2"/>
               <a:buChar char=""/>
             </a:pPr>
+            <a:r>
+              <a:rPr b="0" lang="en-US" sz="2400" spc="-1" strike="noStrike">
+                <a:solidFill>
+                  <a:srgbClr val="050505"/>
+                </a:solidFill>
+                <a:latin typeface="Arial"/>
+                <a:ea typeface="DejaVu Sans"/>
+              </a:rPr>
+              <a:t>Generate markdown (md)</a:t>
+            </a:r>
             <a:endParaRPr b="0" lang="en-US" sz="2400" spc="-1" strike="noStrike">
               <a:latin typeface="Arial"/>
             </a:endParaRPr>
           </a:p>
           <a:p>
-            <a:pPr marL="432000" indent="-322920">
+            <a:pPr marL="432000" indent="-321840">
               <a:lnSpc>
                 <a:spcPct val="100000"/>
               </a:lnSpc>
@@ -3640,8 +3680,50 @@
                 <a:latin typeface="Arial"/>
                 <a:ea typeface="DejaVu Sans"/>
               </a:rPr>
+              <a:t>Synonyms (like abstract and virtual)</a:t>
+            </a:r>
+            <a:endParaRPr b="0" lang="en-US" sz="2400" spc="-1" strike="noStrike">
+              <a:latin typeface="Arial"/>
+            </a:endParaRPr>
+          </a:p>
+          <a:p>
+            <a:pPr marL="432000" indent="-321840">
+              <a:lnSpc>
+                <a:spcPct val="100000"/>
+              </a:lnSpc>
+              <a:spcAft>
+                <a:spcPts val="1060"/>
+              </a:spcAft>
+              <a:buClr>
+                <a:srgbClr val="0066ff"/>
+              </a:buClr>
+              <a:buSzPct val="40000"/>
+              <a:buFont typeface="Wingdings" charset="2"/>
+              <a:buChar char=""/>
+            </a:pPr>
+            <a:r>
+              <a:rPr b="0" lang="en-US" sz="2400" spc="-1" strike="noStrike">
+                <a:solidFill>
+                  <a:srgbClr val="050505"/>
+                </a:solidFill>
+                <a:latin typeface="Arial"/>
+                <a:ea typeface="DejaVu Sans"/>
+              </a:rPr>
               <a:t>Various types of tags (block and inline) </a:t>
             </a:r>
+            <a:endParaRPr b="0" lang="en-US" sz="2400" spc="-1" strike="noStrike">
+              <a:latin typeface="Arial"/>
+            </a:endParaRPr>
+          </a:p>
+          <a:p>
+            <a:pPr>
+              <a:lnSpc>
+                <a:spcPct val="100000"/>
+              </a:lnSpc>
+              <a:spcAft>
+                <a:spcPts val="1060"/>
+              </a:spcAft>
+            </a:pPr>
             <a:endParaRPr b="0" lang="en-US" sz="2400" spc="-1" strike="noStrike">
               <a:latin typeface="Arial"/>
             </a:endParaRPr>
@@ -3719,7 +3801,7 @@
         <p:spPr>
           <a:xfrm>
             <a:off x="1620000" y="216000"/>
-            <a:ext cx="8098920" cy="934920"/>
+            <a:ext cx="8097840" cy="933840"/>
           </a:xfrm>
           <a:prstGeom prst="rect">
             <a:avLst/>
@@ -3770,7 +3852,7 @@
         <p:spPr>
           <a:xfrm>
             <a:off x="1620000" y="1368000"/>
-            <a:ext cx="8098920" cy="3287160"/>
+            <a:ext cx="8097840" cy="3286080"/>
           </a:xfrm>
           <a:prstGeom prst="rect">
             <a:avLst/>
@@ -3791,7 +3873,7 @@
             <a:normAutofit/>
           </a:bodyPr>
           <a:p>
-            <a:pPr marL="432000" indent="-322920">
+            <a:pPr marL="432000" indent="-321840">
               <a:lnSpc>
                 <a:spcPct val="100000"/>
               </a:lnSpc>
@@ -3813,7 +3895,7 @@
                 <a:latin typeface="Arial"/>
                 <a:ea typeface="DejaVu Sans"/>
               </a:rPr>
-              <a:t>Something to do with Machine Learning (A subfield of Artificial Intelligence [AI])</a:t>
+              <a:t>Something to do with Machine Learning (subfield of Artificial Intelligence [AI])</a:t>
             </a:r>
             <a:endParaRPr b="0" lang="en-US" sz="2400" spc="-1" strike="noStrike">
               <a:latin typeface="Arial"/>
@@ -3833,7 +3915,7 @@
             </a:endParaRPr>
           </a:p>
           <a:p>
-            <a:pPr marL="432000" indent="-322920">
+            <a:pPr marL="432000" indent="-321840">
               <a:lnSpc>
                 <a:spcPct val="100000"/>
               </a:lnSpc>
@@ -3855,8 +3937,108 @@
                 <a:latin typeface="Arial"/>
                 <a:ea typeface="DejaVu Sans"/>
               </a:rPr>
-              <a:t>Why be interested in Machine Learning?</a:t>
-            </a:r>
+              <a:t>But -</a:t>
+            </a:r>
+            <a:endParaRPr b="0" lang="en-US" sz="2400" spc="-1" strike="noStrike">
+              <a:latin typeface="Arial"/>
+            </a:endParaRPr>
+          </a:p>
+          <a:p>
+            <a:pPr lvl="2" marL="648000" indent="-215640">
+              <a:lnSpc>
+                <a:spcPct val="100000"/>
+              </a:lnSpc>
+              <a:spcAft>
+                <a:spcPts val="1060"/>
+              </a:spcAft>
+              <a:buClr>
+                <a:srgbClr val="000000"/>
+              </a:buClr>
+              <a:buSzPct val="45000"/>
+              <a:buFont typeface="Wingdings" charset="2"/>
+              <a:buChar char=""/>
+            </a:pPr>
+            <a:r>
+              <a:rPr b="0" lang="en-US" sz="2400" spc="-1" strike="noStrike">
+                <a:solidFill>
+                  <a:srgbClr val="050505"/>
+                </a:solidFill>
+                <a:latin typeface="Arial"/>
+                <a:ea typeface="DejaVu Sans"/>
+              </a:rPr>
+              <a:t>I am a JavaScript guy</a:t>
+            </a:r>
+            <a:endParaRPr b="0" lang="en-US" sz="2400" spc="-1" strike="noStrike">
+              <a:latin typeface="Arial"/>
+            </a:endParaRPr>
+          </a:p>
+          <a:p>
+            <a:pPr lvl="2" marL="648000" indent="-215640">
+              <a:lnSpc>
+                <a:spcPct val="100000"/>
+              </a:lnSpc>
+              <a:spcAft>
+                <a:spcPts val="1060"/>
+              </a:spcAft>
+              <a:buClr>
+                <a:srgbClr val="000000"/>
+              </a:buClr>
+              <a:buSzPct val="45000"/>
+              <a:buFont typeface="Wingdings" charset="2"/>
+              <a:buChar char=""/>
+            </a:pPr>
+            <a:r>
+              <a:rPr b="0" lang="en-US" sz="2400" spc="-1" strike="noStrike">
+                <a:solidFill>
+                  <a:srgbClr val="050505"/>
+                </a:solidFill>
+                <a:latin typeface="Arial"/>
+                <a:ea typeface="DejaVu Sans"/>
+              </a:rPr>
+              <a:t>We do not do Machine Learning</a:t>
+            </a:r>
+            <a:endParaRPr b="0" lang="en-US" sz="2400" spc="-1" strike="noStrike">
+              <a:latin typeface="Arial"/>
+            </a:endParaRPr>
+          </a:p>
+          <a:p>
+            <a:pPr lvl="2" marL="648000" indent="-215640">
+              <a:lnSpc>
+                <a:spcPct val="100000"/>
+              </a:lnSpc>
+              <a:spcAft>
+                <a:spcPts val="1060"/>
+              </a:spcAft>
+              <a:buClr>
+                <a:srgbClr val="000000"/>
+              </a:buClr>
+              <a:buSzPct val="45000"/>
+              <a:buFont typeface="Wingdings" charset="2"/>
+              <a:buChar char=""/>
+            </a:pPr>
+            <a:r>
+              <a:rPr b="0" lang="en-US" sz="2400" spc="-1" strike="noStrike">
+                <a:solidFill>
+                  <a:srgbClr val="050505"/>
+                </a:solidFill>
+                <a:latin typeface="Arial"/>
+                <a:ea typeface="DejaVu Sans"/>
+              </a:rPr>
+              <a:t>This is not a Machine Learning talk</a:t>
+            </a:r>
+            <a:endParaRPr b="0" lang="en-US" sz="2400" spc="-1" strike="noStrike">
+              <a:latin typeface="Arial"/>
+            </a:endParaRPr>
+          </a:p>
+          <a:p>
+            <a:pPr>
+              <a:lnSpc>
+                <a:spcPct val="100000"/>
+              </a:lnSpc>
+              <a:spcAft>
+                <a:spcPts val="1060"/>
+              </a:spcAft>
+            </a:pPr>
             <a:endParaRPr b="0" lang="en-US" sz="2400" spc="-1" strike="noStrike">
               <a:latin typeface="Arial"/>
             </a:endParaRPr>
@@ -3921,7 +4103,7 @@
         <p:spPr>
           <a:xfrm>
             <a:off x="1620000" y="216000"/>
-            <a:ext cx="8098920" cy="934920"/>
+            <a:ext cx="8097840" cy="933840"/>
           </a:xfrm>
           <a:prstGeom prst="rect">
             <a:avLst/>
@@ -3955,7 +4137,7 @@
                 <a:latin typeface="Times New Roman"/>
                 <a:ea typeface="DejaVu Sans"/>
               </a:rPr>
-              <a:t>Biology Transformation</a:t>
+              <a:t>Biology’s Transformation</a:t>
             </a:r>
             <a:endParaRPr b="0" lang="en-US" sz="3300" spc="-1" strike="noStrike">
               <a:latin typeface="Arial"/>
@@ -3972,7 +4154,7 @@
         <p:spPr>
           <a:xfrm>
             <a:off x="1620000" y="1368000"/>
-            <a:ext cx="8098920" cy="3934440"/>
+            <a:ext cx="8097840" cy="3933360"/>
           </a:xfrm>
           <a:prstGeom prst="rect">
             <a:avLst/>
@@ -3993,7 +4175,7 @@
             <a:normAutofit/>
           </a:bodyPr>
           <a:p>
-            <a:pPr marL="432000" indent="-322920">
+            <a:pPr marL="432000" indent="-321840">
               <a:lnSpc>
                 <a:spcPct val="100000"/>
               </a:lnSpc>
@@ -4022,7 +4204,7 @@
             </a:endParaRPr>
           </a:p>
           <a:p>
-            <a:pPr lvl="1" marL="864000" indent="-322920">
+            <a:pPr lvl="1" marL="864000" indent="-321840">
               <a:lnSpc>
                 <a:spcPct val="100000"/>
               </a:lnSpc>
@@ -4051,7 +4233,7 @@
             </a:endParaRPr>
           </a:p>
           <a:p>
-            <a:pPr lvl="1" marL="864000" indent="-322920">
+            <a:pPr lvl="1" marL="864000" indent="-321840">
               <a:lnSpc>
                 <a:spcPct val="100000"/>
               </a:lnSpc>
@@ -4080,7 +4262,7 @@
             </a:endParaRPr>
           </a:p>
           <a:p>
-            <a:pPr lvl="1" marL="864000" indent="-322920">
+            <a:pPr lvl="1" marL="864000" indent="-321840">
               <a:lnSpc>
                 <a:spcPct val="100000"/>
               </a:lnSpc>
@@ -4095,7 +4277,7 @@
               <a:buChar char=""/>
             </a:pPr>
             <a:r>
-              <a:rPr b="1" lang="en-US" sz="3600" spc="-1" strike="noStrike">
+              <a:rPr b="1" lang="en-US" sz="2600" spc="-1" strike="noStrike">
                 <a:solidFill>
                   <a:srgbClr val="050505"/>
                 </a:solidFill>
@@ -4185,10 +4367,11 @@
               <a:t> → </a:t>
             </a:r>
             <a:r>
-              <a:rPr b="1" lang="en-US" sz="2600" spc="-1" strike="noStrike">
-                <a:solidFill>
-                  <a:srgbClr val="050505"/>
-                </a:solidFill>
+              <a:rPr b="1" lang="en-US" sz="2600" spc="-1" strike="noStrike" u="sng">
+                <a:solidFill>
+                  <a:srgbClr val="050505"/>
+                </a:solidFill>
+                <a:uFillTx/>
                 <a:latin typeface="Arial"/>
                 <a:ea typeface="DejaVu Sans"/>
               </a:rPr>
@@ -4222,7 +4405,7 @@
             </a:endParaRPr>
           </a:p>
           <a:p>
-            <a:pPr marL="432000" indent="-322920">
+            <a:pPr marL="432000" indent="-321840">
               <a:lnSpc>
                 <a:spcPct val="100000"/>
               </a:lnSpc>
@@ -4244,19 +4427,9 @@
                 <a:latin typeface="Arial"/>
                 <a:ea typeface="DejaVu Sans"/>
               </a:rPr>
-              <a:t>Is AI a viable tool?</a:t>
-            </a:r>
-            <a:r>
-              <a:rPr b="0" lang="en-US" sz="2400" spc="-1" strike="noStrike">
-                <a:solidFill>
-                  <a:srgbClr val="050505"/>
-                </a:solidFill>
-                <a:latin typeface="Arial"/>
-                <a:ea typeface="DejaVu Sans"/>
-              </a:rPr>
-              <a:t> </a:t>
-            </a:r>
-            <a:endParaRPr b="0" lang="en-US" sz="2400" spc="-1" strike="noStrike">
+              <a:t>Need to handle big biological data sets</a:t>
+            </a:r>
+            <a:endParaRPr b="0" lang="en-US" sz="2800" spc="-1" strike="noStrike">
               <a:latin typeface="Arial"/>
             </a:endParaRPr>
           </a:p>
@@ -4320,7 +4493,7 @@
         <p:spPr>
           <a:xfrm>
             <a:off x="1620000" y="216000"/>
-            <a:ext cx="8098920" cy="934920"/>
+            <a:ext cx="8097840" cy="933840"/>
           </a:xfrm>
           <a:prstGeom prst="rect">
             <a:avLst/>
@@ -4371,7 +4544,7 @@
         <p:spPr>
           <a:xfrm>
             <a:off x="1620000" y="1368000"/>
-            <a:ext cx="8098920" cy="3287160"/>
+            <a:ext cx="8097840" cy="3286080"/>
           </a:xfrm>
           <a:prstGeom prst="rect">
             <a:avLst/>
@@ -4392,7 +4565,7 @@
             <a:normAutofit/>
           </a:bodyPr>
           <a:p>
-            <a:pPr marL="432000" indent="-322920">
+            <a:pPr marL="432000" indent="-321840">
               <a:lnSpc>
                 <a:spcPct val="100000"/>
               </a:lnSpc>
@@ -4421,7 +4594,7 @@
             </a:endParaRPr>
           </a:p>
           <a:p>
-            <a:pPr lvl="1" marL="864000" indent="-322920">
+            <a:pPr lvl="1" marL="864000" indent="-321840">
               <a:lnSpc>
                 <a:spcPct val="100000"/>
               </a:lnSpc>
@@ -4450,7 +4623,7 @@
             </a:endParaRPr>
           </a:p>
           <a:p>
-            <a:pPr lvl="1" marL="864000" indent="-322920">
+            <a:pPr lvl="1" marL="864000" indent="-321840">
               <a:lnSpc>
                 <a:spcPct val="100000"/>
               </a:lnSpc>
@@ -4472,14 +4645,14 @@
                 <a:latin typeface="Arial"/>
                 <a:ea typeface="DejaVu Sans"/>
               </a:rPr>
-              <a:t>Best chess player is human assisted by Artificial Intelligenb</a:t>
+              <a:t>Best chess player is human assisted by Artificial Intelligent</a:t>
             </a:r>
             <a:endParaRPr b="0" lang="en-US" sz="2090" spc="-1" strike="noStrike">
               <a:latin typeface="Arial"/>
             </a:endParaRPr>
           </a:p>
           <a:p>
-            <a:pPr lvl="1" marL="864000" indent="-322920">
+            <a:pPr lvl="1" marL="864000" indent="-321840">
               <a:lnSpc>
                 <a:spcPct val="100000"/>
               </a:lnSpc>
@@ -4521,7 +4694,7 @@
             </a:endParaRPr>
           </a:p>
           <a:p>
-            <a:pPr marL="432000" indent="-322920">
+            <a:pPr marL="432000" indent="-321840">
               <a:lnSpc>
                 <a:spcPct val="100000"/>
               </a:lnSpc>
@@ -4550,7 +4723,7 @@
             </a:endParaRPr>
           </a:p>
           <a:p>
-            <a:pPr lvl="1" marL="864000" indent="-322920">
+            <a:pPr lvl="1" marL="864000" indent="-321840">
               <a:lnSpc>
                 <a:spcPct val="100000"/>
               </a:lnSpc>
@@ -4592,7 +4765,7 @@
             </a:endParaRPr>
           </a:p>
           <a:p>
-            <a:pPr marL="432000" indent="-322920">
+            <a:pPr marL="432000" indent="-321840">
               <a:lnSpc>
                 <a:spcPct val="100000"/>
               </a:lnSpc>
@@ -4680,7 +4853,7 @@
         <p:spPr>
           <a:xfrm>
             <a:off x="1620000" y="216000"/>
-            <a:ext cx="8098920" cy="934920"/>
+            <a:ext cx="8097840" cy="933840"/>
           </a:xfrm>
           <a:prstGeom prst="rect">
             <a:avLst/>
@@ -4731,7 +4904,7 @@
         <p:spPr>
           <a:xfrm>
             <a:off x="1620000" y="1368000"/>
-            <a:ext cx="8098920" cy="3287160"/>
+            <a:ext cx="8097840" cy="3286080"/>
           </a:xfrm>
           <a:prstGeom prst="rect">
             <a:avLst/>
@@ -4752,7 +4925,7 @@
             <a:normAutofit/>
           </a:bodyPr>
           <a:p>
-            <a:pPr marL="432000" indent="-322920">
+            <a:pPr marL="432000" indent="-321840">
               <a:lnSpc>
                 <a:spcPct val="100000"/>
               </a:lnSpc>
@@ -4781,7 +4954,7 @@
             </a:endParaRPr>
           </a:p>
           <a:p>
-            <a:pPr marL="432000" indent="-322920">
+            <a:pPr marL="432000" indent="-321840">
               <a:lnSpc>
                 <a:spcPct val="100000"/>
               </a:lnSpc>
@@ -4800,7 +4973,7 @@
             </a:endParaRPr>
           </a:p>
           <a:p>
-            <a:pPr marL="432000" indent="-322920">
+            <a:pPr marL="432000" indent="-321840">
               <a:lnSpc>
                 <a:spcPct val="100000"/>
               </a:lnSpc>
@@ -4822,14 +4995,27 @@
                 <a:latin typeface="Arial"/>
                 <a:ea typeface="DejaVu Sans"/>
               </a:rPr>
-              <a:t>Demo or paper review of a Genomic data problems addressed using machine learning</a:t>
+              <a:t>Overview of Artificial Intelligence</a:t>
             </a:r>
             <a:endParaRPr b="0" lang="en-US" sz="2400" spc="-1" strike="noStrike">
               <a:latin typeface="Arial"/>
             </a:endParaRPr>
           </a:p>
           <a:p>
-            <a:pPr marL="432000" indent="-322920">
+            <a:pPr>
+              <a:lnSpc>
+                <a:spcPct val="100000"/>
+              </a:lnSpc>
+              <a:spcAft>
+                <a:spcPts val="1060"/>
+              </a:spcAft>
+            </a:pPr>
+            <a:endParaRPr b="0" lang="en-US" sz="2400" spc="-1" strike="noStrike">
+              <a:latin typeface="Arial"/>
+            </a:endParaRPr>
+          </a:p>
+          <a:p>
+            <a:pPr marL="432000" indent="-321840">
               <a:lnSpc>
                 <a:spcPct val="100000"/>
               </a:lnSpc>
@@ -4843,12 +5029,35 @@
               <a:buFont typeface="Wingdings" charset="2"/>
               <a:buChar char=""/>
             </a:pPr>
+            <a:r>
+              <a:rPr b="0" lang="en-US" sz="2400" spc="-1" strike="noStrike">
+                <a:solidFill>
+                  <a:srgbClr val="050505"/>
+                </a:solidFill>
+                <a:latin typeface="Arial"/>
+                <a:ea typeface="DejaVu Sans"/>
+              </a:rPr>
+              <a:t>Demo or paper review of a Genomic data problems addressed using machine learning</a:t>
+            </a:r>
             <a:endParaRPr b="0" lang="en-US" sz="2400" spc="-1" strike="noStrike">
               <a:latin typeface="Arial"/>
             </a:endParaRPr>
           </a:p>
           <a:p>
-            <a:pPr marL="432000" indent="-322920">
+            <a:pPr>
+              <a:lnSpc>
+                <a:spcPct val="100000"/>
+              </a:lnSpc>
+              <a:spcAft>
+                <a:spcPts val="1060"/>
+              </a:spcAft>
+            </a:pPr>
+            <a:endParaRPr b="0" lang="en-US" sz="2400" spc="-1" strike="noStrike">
+              <a:latin typeface="Arial"/>
+            </a:endParaRPr>
+          </a:p>
+          <a:p>
+            <a:pPr marL="432000" indent="-321840">
               <a:lnSpc>
                 <a:spcPct val="100000"/>
               </a:lnSpc>
@@ -4936,7 +5145,7 @@
         <p:spPr>
           <a:xfrm>
             <a:off x="1620000" y="216000"/>
-            <a:ext cx="8098920" cy="934920"/>
+            <a:ext cx="8097840" cy="933840"/>
           </a:xfrm>
           <a:prstGeom prst="rect">
             <a:avLst/>
@@ -4970,7 +5179,7 @@
                 <a:latin typeface="Times New Roman"/>
                 <a:ea typeface="DejaVu Sans"/>
               </a:rPr>
-              <a:t>References/Further Reading</a:t>
+              <a:t>References</a:t>
             </a:r>
             <a:endParaRPr b="0" lang="en-US" sz="3300" spc="-1" strike="noStrike">
               <a:latin typeface="Arial"/>
@@ -4986,8 +5195,8 @@
         </p:nvSpPr>
         <p:spPr>
           <a:xfrm>
-            <a:off x="1169280" y="1368000"/>
-            <a:ext cx="8868600" cy="3843000"/>
+            <a:off x="1620000" y="1368000"/>
+            <a:ext cx="8097840" cy="3286080"/>
           </a:xfrm>
           <a:prstGeom prst="rect">
             <a:avLst/>
@@ -5008,32 +5217,49 @@
             <a:normAutofit/>
           </a:bodyPr>
           <a:p>
-            <a:pPr marL="432000" indent="-322920">
-              <a:lnSpc>
-                <a:spcPct val="100000"/>
-              </a:lnSpc>
-              <a:spcAft>
-                <a:spcPts val="1060"/>
-              </a:spcAft>
-              <a:buClr>
-                <a:srgbClr val="0066ff"/>
-              </a:buClr>
-              <a:buSzPct val="40000"/>
-              <a:buFont typeface="Wingdings" charset="2"/>
-              <a:buChar char=""/>
-            </a:pPr>
-            <a:r>
-              <a:rPr b="0" lang="en-US" sz="2400" spc="-1" strike="noStrike">
-                <a:solidFill>
-                  <a:srgbClr val="050505"/>
-                </a:solidFill>
-                <a:latin typeface="Arial"/>
-                <a:ea typeface="DejaVu Sans"/>
-              </a:rPr>
-              <a:t>Text Editor Plugins: </a:t>
-            </a:r>
-            <a:r>
-              <a:rPr b="0" lang="en-US" sz="2400" spc="-1" strike="noStrike" u="sng">
+            <a:pPr>
+              <a:lnSpc>
+                <a:spcPct val="100000"/>
+              </a:lnSpc>
+              <a:spcAft>
+                <a:spcPts val="1060"/>
+              </a:spcAft>
+            </a:pPr>
+            <a:r>
+              <a:rPr b="0" lang="en-US" sz="1800" spc="-1" strike="noStrike">
+                <a:solidFill>
+                  <a:srgbClr val="050505"/>
+                </a:solidFill>
+                <a:latin typeface="Arial"/>
+                <a:ea typeface="DejaVu Sans"/>
+              </a:rPr>
+              <a:t>* Website: http://usejsdoc.org</a:t>
+            </a:r>
+            <a:endParaRPr b="0" lang="en-US" sz="1800" spc="-1" strike="noStrike">
+              <a:latin typeface="Arial"/>
+            </a:endParaRPr>
+          </a:p>
+          <a:p>
+            <a:pPr>
+              <a:lnSpc>
+                <a:spcPct val="100000"/>
+              </a:lnSpc>
+              <a:spcAft>
+                <a:spcPts val="1060"/>
+              </a:spcAft>
+            </a:pPr>
+            <a:r>
+              <a:rPr b="0" lang="en-US" sz="1800" spc="-1" strike="noStrike">
+                <a:solidFill>
+                  <a:srgbClr val="050505"/>
+                </a:solidFill>
+                <a:latin typeface="Arial"/>
+                <a:ea typeface="DejaVu Sans"/>
+              </a:rPr>
+              <a:t>* Github: </a:t>
+            </a:r>
+            <a:r>
+              <a:rPr b="0" lang="en-US" sz="1800" spc="-1" strike="noStrike" u="sng">
                 <a:solidFill>
                   <a:srgbClr val="0000ff"/>
                 </a:solidFill>
@@ -5042,9 +5268,9 @@
                 <a:ea typeface="DejaVu Sans"/>
                 <a:hlinkClick r:id="rId1"/>
               </a:rPr>
-              <a:t>https://github.com/documentationjs/documentation/wiki/Text-editor-plugins</a:t>
-            </a:r>
-            <a:endParaRPr b="0" lang="en-US" sz="2400" spc="-1" strike="noStrike">
+              <a:t>https://github.com/jsdoc3/jsdoc</a:t>
+            </a:r>
+            <a:endParaRPr b="0" lang="en-US" sz="1800" spc="-1" strike="noStrike">
               <a:latin typeface="Arial"/>
             </a:endParaRPr>
           </a:p>
@@ -5057,37 +5283,18 @@
                 <a:spcPts val="1060"/>
               </a:spcAft>
             </a:pPr>
-            <a:endParaRPr b="0" lang="en-US" sz="2400" spc="-1" strike="noStrike">
-              <a:latin typeface="Arial"/>
-            </a:endParaRPr>
-          </a:p>
-          <a:p>
-            <a:pPr marL="432000" indent="-322920">
-              <a:lnSpc>
-                <a:spcPct val="100000"/>
-              </a:lnSpc>
-              <a:spcAft>
-                <a:spcPts val="1060"/>
-              </a:spcAft>
-              <a:buClr>
-                <a:srgbClr val="0066ff"/>
-              </a:buClr>
-              <a:buSzPct val="40000"/>
-              <a:buFont typeface="Wingdings" charset="2"/>
-              <a:buChar char=""/>
-            </a:pPr>
-            <a:r>
-              <a:rPr b="0" lang="en-US" sz="2400" spc="-1" strike="noStrike">
-                <a:solidFill>
-                  <a:srgbClr val="050505"/>
-                </a:solidFill>
-                <a:latin typeface="Arial"/>
-                <a:ea typeface="DejaVu Sans"/>
-              </a:rPr>
-              <a:t>Rauschmayer blog on JSDoc: </a:t>
-            </a:r>
-            <a:r>
-              <a:rPr b="0" lang="en-US" sz="2400" spc="-1" strike="noStrike" u="sng">
+            <a:r>
+              <a:rPr b="0" lang="en-US" sz="1800" spc="-1" strike="noStrike">
+                <a:solidFill>
+                  <a:srgbClr val="050505"/>
+                </a:solidFill>
+                <a:latin typeface="Arial"/>
+                <a:ea typeface="DejaVu Sans"/>
+              </a:rPr>
+              <a:t>* Rauschmayer blog on JSDoc: </a:t>
+            </a:r>
+            <a:r>
+              <a:rPr b="0" lang="en-US" sz="1800" spc="-1" strike="noStrike" u="sng">
                 <a:solidFill>
                   <a:srgbClr val="0000ff"/>
                 </a:solidFill>
@@ -5098,7 +5305,7 @@
               </a:rPr>
               <a:t>http://2ality.com/2011/08/jsdoc-intro.html</a:t>
             </a:r>
-            <a:endParaRPr b="0" lang="en-US" sz="2400" spc="-1" strike="noStrike">
+            <a:endParaRPr b="0" lang="en-US" sz="1800" spc="-1" strike="noStrike">
               <a:latin typeface="Arial"/>
             </a:endParaRPr>
           </a:p>
@@ -5111,48 +5318,30 @@
                 <a:spcPts val="1060"/>
               </a:spcAft>
             </a:pPr>
-            <a:endParaRPr b="0" lang="en-US" sz="2400" spc="-1" strike="noStrike">
-              <a:latin typeface="Arial"/>
-            </a:endParaRPr>
-          </a:p>
-          <a:p>
-            <a:pPr marL="432000" indent="-322920">
-              <a:lnSpc>
-                <a:spcPct val="100000"/>
-              </a:lnSpc>
-              <a:spcAft>
-                <a:spcPts val="1060"/>
-              </a:spcAft>
-              <a:buClr>
-                <a:srgbClr val="0066ff"/>
-              </a:buClr>
-              <a:buSzPct val="40000"/>
-              <a:buFont typeface="Wingdings" charset="2"/>
-              <a:buChar char=""/>
-            </a:pPr>
-            <a:r>
-              <a:rPr b="0" lang="en-US" sz="2400" spc="-1" strike="noStrike">
-                <a:solidFill>
-                  <a:srgbClr val="050505"/>
-                </a:solidFill>
-                <a:latin typeface="Arial"/>
-                <a:ea typeface="DejaVu Sans"/>
-              </a:rPr>
-              <a:t>JSDoc Website: </a:t>
-            </a:r>
-            <a:r>
-              <a:rPr b="0" lang="en-US" sz="2400" spc="-1" strike="noStrike" u="sng">
-                <a:solidFill>
-                  <a:srgbClr val="0000ff"/>
-                </a:solidFill>
-                <a:uFillTx/>
-                <a:latin typeface="Arial"/>
-                <a:ea typeface="DejaVu Sans"/>
-                <a:hlinkClick r:id="rId3"/>
-              </a:rPr>
-              <a:t>http://usejsdoc.org</a:t>
-            </a:r>
-            <a:endParaRPr b="0" lang="en-US" sz="2400" spc="-1" strike="noStrike">
+            <a:r>
+              <a:rPr b="0" lang="en-US" sz="1800" spc="-1" strike="noStrike">
+                <a:solidFill>
+                  <a:srgbClr val="050505"/>
+                </a:solidFill>
+                <a:latin typeface="Arial"/>
+                <a:ea typeface="DejaVu Sans"/>
+              </a:rPr>
+              <a:t>* “Speaking JavaScript” by Rauschmayer http://speakingjs.com/es5/ch29.html</a:t>
+            </a:r>
+            <a:endParaRPr b="0" lang="en-US" sz="1800" spc="-1" strike="noStrike">
+              <a:latin typeface="Arial"/>
+            </a:endParaRPr>
+          </a:p>
+          <a:p>
+            <a:pPr>
+              <a:lnSpc>
+                <a:spcPct val="100000"/>
+              </a:lnSpc>
+              <a:spcAft>
+                <a:spcPts val="1060"/>
+              </a:spcAft>
+            </a:pPr>
+            <a:endParaRPr b="0" lang="en-US" sz="1800" spc="-1" strike="noStrike">
               <a:latin typeface="Arial"/>
             </a:endParaRPr>
           </a:p>
@@ -5216,7 +5405,7 @@
         <p:spPr>
           <a:xfrm>
             <a:off x="1620000" y="216000"/>
-            <a:ext cx="8098920" cy="934920"/>
+            <a:ext cx="8097840" cy="933840"/>
           </a:xfrm>
           <a:prstGeom prst="rect">
             <a:avLst/>
@@ -5267,7 +5456,7 @@
         <p:spPr>
           <a:xfrm>
             <a:off x="1620000" y="1368000"/>
-            <a:ext cx="8098920" cy="3287160"/>
+            <a:ext cx="8097840" cy="3286080"/>
           </a:xfrm>
           <a:prstGeom prst="rect">
             <a:avLst/>
@@ -5340,7 +5529,7 @@
             </a:endParaRPr>
           </a:p>
           <a:p>
-            <a:pPr marL="432000" indent="-322920">
+            <a:pPr marL="432000" indent="-321840">
               <a:lnSpc>
                 <a:spcPct val="100000"/>
               </a:lnSpc>
@@ -5428,7 +5617,7 @@
         <p:spPr>
           <a:xfrm>
             <a:off x="1620000" y="216000"/>
-            <a:ext cx="8098920" cy="934920"/>
+            <a:ext cx="8097840" cy="933840"/>
           </a:xfrm>
           <a:prstGeom prst="rect">
             <a:avLst/>
@@ -5489,7 +5678,7 @@
         <p:spPr>
           <a:xfrm>
             <a:off x="1620000" y="1368000"/>
-            <a:ext cx="8098920" cy="3287160"/>
+            <a:ext cx="8097840" cy="3286080"/>
           </a:xfrm>
           <a:prstGeom prst="rect">
             <a:avLst/>
@@ -5510,7 +5699,7 @@
             <a:normAutofit/>
           </a:bodyPr>
           <a:p>
-            <a:pPr marL="432000" indent="-322920">
+            <a:pPr marL="432000" indent="-321840">
               <a:lnSpc>
                 <a:spcPct val="100000"/>
               </a:lnSpc>
@@ -5539,7 +5728,20 @@
             </a:endParaRPr>
           </a:p>
           <a:p>
-            <a:pPr marL="432000" indent="-322920">
+            <a:pPr>
+              <a:lnSpc>
+                <a:spcPct val="100000"/>
+              </a:lnSpc>
+              <a:spcAft>
+                <a:spcPts val="1060"/>
+              </a:spcAft>
+            </a:pPr>
+            <a:endParaRPr b="0" lang="en-US" sz="2800" spc="-1" strike="noStrike">
+              <a:latin typeface="Arial"/>
+            </a:endParaRPr>
+          </a:p>
+          <a:p>
+            <a:pPr marL="432000" indent="-321840">
               <a:lnSpc>
                 <a:spcPct val="100000"/>
               </a:lnSpc>
@@ -5553,12 +5755,35 @@
               <a:buFont typeface="Wingdings" charset="2"/>
               <a:buChar char=""/>
             </a:pPr>
+            <a:r>
+              <a:rPr b="0" lang="en-US" sz="2800" spc="-1" strike="noStrike">
+                <a:solidFill>
+                  <a:srgbClr val="050505"/>
+                </a:solidFill>
+                <a:latin typeface="Arial"/>
+                <a:ea typeface="DejaVu Sans"/>
+              </a:rPr>
+              <a:t>Structure and Terminology</a:t>
+            </a:r>
             <a:endParaRPr b="0" lang="en-US" sz="2800" spc="-1" strike="noStrike">
               <a:latin typeface="Arial"/>
             </a:endParaRPr>
           </a:p>
           <a:p>
-            <a:pPr marL="432000" indent="-322920">
+            <a:pPr>
+              <a:lnSpc>
+                <a:spcPct val="100000"/>
+              </a:lnSpc>
+              <a:spcAft>
+                <a:spcPts val="1060"/>
+              </a:spcAft>
+            </a:pPr>
+            <a:endParaRPr b="0" lang="en-US" sz="2800" spc="-1" strike="noStrike">
+              <a:latin typeface="Arial"/>
+            </a:endParaRPr>
+          </a:p>
+          <a:p>
+            <a:pPr marL="432000" indent="-321840">
               <a:lnSpc>
                 <a:spcPct val="100000"/>
               </a:lnSpc>
@@ -5580,81 +5805,27 @@
                 <a:latin typeface="Arial"/>
                 <a:ea typeface="DejaVu Sans"/>
               </a:rPr>
-              <a:t>Structure and Terminology</a:t>
+              <a:t>Demo</a:t>
             </a:r>
             <a:endParaRPr b="0" lang="en-US" sz="2800" spc="-1" strike="noStrike">
               <a:latin typeface="Arial"/>
             </a:endParaRPr>
           </a:p>
           <a:p>
-            <a:pPr marL="432000" indent="-322920">
-              <a:lnSpc>
-                <a:spcPct val="100000"/>
-              </a:lnSpc>
-              <a:spcAft>
-                <a:spcPts val="1060"/>
-              </a:spcAft>
-              <a:buClr>
-                <a:srgbClr val="0066ff"/>
-              </a:buClr>
-              <a:buSzPct val="40000"/>
-              <a:buFont typeface="Wingdings" charset="2"/>
-              <a:buChar char=""/>
+            <a:pPr>
+              <a:lnSpc>
+                <a:spcPct val="100000"/>
+              </a:lnSpc>
+              <a:spcAft>
+                <a:spcPts val="1060"/>
+              </a:spcAft>
             </a:pPr>
             <a:endParaRPr b="0" lang="en-US" sz="2800" spc="-1" strike="noStrike">
               <a:latin typeface="Arial"/>
             </a:endParaRPr>
           </a:p>
           <a:p>
-            <a:pPr marL="432000" indent="-322920">
-              <a:lnSpc>
-                <a:spcPct val="100000"/>
-              </a:lnSpc>
-              <a:spcAft>
-                <a:spcPts val="1060"/>
-              </a:spcAft>
-              <a:buClr>
-                <a:srgbClr val="0066ff"/>
-              </a:buClr>
-              <a:buSzPct val="40000"/>
-              <a:buFont typeface="Wingdings" charset="2"/>
-              <a:buChar char=""/>
-            </a:pPr>
-            <a:r>
-              <a:rPr b="0" lang="en-US" sz="2800" spc="-1" strike="noStrike">
-                <a:solidFill>
-                  <a:srgbClr val="050505"/>
-                </a:solidFill>
-                <a:latin typeface="Arial"/>
-                <a:ea typeface="DejaVu Sans"/>
-              </a:rPr>
-              <a:t>Demo</a:t>
-            </a:r>
-            <a:endParaRPr b="0" lang="en-US" sz="2800" spc="-1" strike="noStrike">
-              <a:latin typeface="Arial"/>
-            </a:endParaRPr>
-          </a:p>
-          <a:p>
-            <a:pPr marL="432000" indent="-322920">
-              <a:lnSpc>
-                <a:spcPct val="100000"/>
-              </a:lnSpc>
-              <a:spcAft>
-                <a:spcPts val="1060"/>
-              </a:spcAft>
-              <a:buClr>
-                <a:srgbClr val="0066ff"/>
-              </a:buClr>
-              <a:buSzPct val="40000"/>
-              <a:buFont typeface="Wingdings" charset="2"/>
-              <a:buChar char=""/>
-            </a:pPr>
-            <a:endParaRPr b="0" lang="en-US" sz="2800" spc="-1" strike="noStrike">
-              <a:latin typeface="Arial"/>
-            </a:endParaRPr>
-          </a:p>
-          <a:p>
-            <a:pPr marL="432000" indent="-322920">
+            <a:pPr marL="432000" indent="-321840">
               <a:lnSpc>
                 <a:spcPct val="100000"/>
               </a:lnSpc>
@@ -5742,7 +5913,7 @@
         <p:spPr>
           <a:xfrm>
             <a:off x="1620000" y="216000"/>
-            <a:ext cx="8098920" cy="934920"/>
+            <a:ext cx="8097840" cy="933840"/>
           </a:xfrm>
           <a:prstGeom prst="rect">
             <a:avLst/>
@@ -5793,7 +5964,7 @@
         <p:spPr>
           <a:xfrm>
             <a:off x="1620000" y="1368000"/>
-            <a:ext cx="8098920" cy="3287160"/>
+            <a:ext cx="8097840" cy="3286080"/>
           </a:xfrm>
           <a:prstGeom prst="rect">
             <a:avLst/>
@@ -5814,7 +5985,7 @@
             <a:normAutofit/>
           </a:bodyPr>
           <a:p>
-            <a:pPr marL="432000" indent="-322920">
+            <a:pPr marL="432000" indent="-321840">
               <a:lnSpc>
                 <a:spcPct val="100000"/>
               </a:lnSpc>
@@ -5843,7 +6014,7 @@
             </a:endParaRPr>
           </a:p>
           <a:p>
-            <a:pPr lvl="4" marL="1080000" indent="-215280">
+            <a:pPr lvl="4" marL="1080000" indent="-214200">
               <a:lnSpc>
                 <a:spcPct val="100000"/>
               </a:lnSpc>
@@ -5865,14 +6036,14 @@
                 <a:latin typeface="Arial"/>
                 <a:ea typeface="DejaVu Sans"/>
               </a:rPr>
-              <a:t>Comments to be extracted </a:t>
+              <a:t>JavaScript Comments </a:t>
             </a:r>
             <a:endParaRPr b="0" lang="en-US" sz="2400" spc="-1" strike="noStrike">
               <a:latin typeface="Arial"/>
             </a:endParaRPr>
           </a:p>
           <a:p>
-            <a:pPr lvl="4" marL="1080000" indent="-215280">
+            <a:pPr lvl="4" marL="1080000" indent="-214200">
               <a:lnSpc>
                 <a:spcPct val="100000"/>
               </a:lnSpc>
@@ -5901,7 +6072,20 @@
             </a:endParaRPr>
           </a:p>
           <a:p>
-            <a:pPr marL="432000" indent="-322920">
+            <a:pPr>
+              <a:lnSpc>
+                <a:spcPct val="100000"/>
+              </a:lnSpc>
+              <a:spcAft>
+                <a:spcPts val="1060"/>
+              </a:spcAft>
+            </a:pPr>
+            <a:endParaRPr b="0" lang="en-US" sz="2400" spc="-1" strike="noStrike">
+              <a:latin typeface="Arial"/>
+            </a:endParaRPr>
+          </a:p>
+          <a:p>
+            <a:pPr marL="432000" indent="-321840">
               <a:lnSpc>
                 <a:spcPct val="100000"/>
               </a:lnSpc>
@@ -5915,12 +6099,35 @@
               <a:buFont typeface="Wingdings" charset="2"/>
               <a:buChar char=""/>
             </a:pPr>
+            <a:r>
+              <a:rPr b="0" lang="en-US" sz="2400" spc="-1" strike="noStrike">
+                <a:solidFill>
+                  <a:srgbClr val="050505"/>
+                </a:solidFill>
+                <a:latin typeface="Arial"/>
+                <a:ea typeface="DejaVu Sans"/>
+              </a:rPr>
+              <a:t>Similar to python’s doc string</a:t>
+            </a:r>
             <a:endParaRPr b="0" lang="en-US" sz="2400" spc="-1" strike="noStrike">
               <a:latin typeface="Arial"/>
             </a:endParaRPr>
           </a:p>
           <a:p>
-            <a:pPr marL="432000" indent="-322920">
+            <a:pPr>
+              <a:lnSpc>
+                <a:spcPct val="100000"/>
+              </a:lnSpc>
+              <a:spcAft>
+                <a:spcPts val="1060"/>
+              </a:spcAft>
+            </a:pPr>
+            <a:endParaRPr b="0" lang="en-US" sz="2400" spc="-1" strike="noStrike">
+              <a:latin typeface="Arial"/>
+            </a:endParaRPr>
+          </a:p>
+          <a:p>
+            <a:pPr marL="432000" indent="-321840">
               <a:lnSpc>
                 <a:spcPct val="100000"/>
               </a:lnSpc>
@@ -5942,55 +6149,7 @@
                 <a:latin typeface="Arial"/>
                 <a:ea typeface="DejaVu Sans"/>
               </a:rPr>
-              <a:t>Similar to python’s doc string and .NET’s XML Comments</a:t>
-            </a:r>
-            <a:endParaRPr b="0" lang="en-US" sz="2400" spc="-1" strike="noStrike">
-              <a:latin typeface="Arial"/>
-            </a:endParaRPr>
-          </a:p>
-          <a:p>
-            <a:pPr marL="432000" indent="-322920">
-              <a:lnSpc>
-                <a:spcPct val="100000"/>
-              </a:lnSpc>
-              <a:spcAft>
-                <a:spcPts val="1060"/>
-              </a:spcAft>
-              <a:buClr>
-                <a:srgbClr val="0066ff"/>
-              </a:buClr>
-              <a:buSzPct val="40000"/>
-              <a:buFont typeface="Wingdings" charset="2"/>
-              <a:buChar char=""/>
-            </a:pPr>
-            <a:endParaRPr b="0" lang="en-US" sz="2400" spc="-1" strike="noStrike">
-              <a:latin typeface="Arial"/>
-            </a:endParaRPr>
-          </a:p>
-          <a:p>
-            <a:pPr marL="432000" indent="-322920">
-              <a:lnSpc>
-                <a:spcPct val="100000"/>
-              </a:lnSpc>
-              <a:spcAft>
-                <a:spcPts val="1060"/>
-              </a:spcAft>
-              <a:buClr>
-                <a:srgbClr val="0066ff"/>
-              </a:buClr>
-              <a:buSzPct val="40000"/>
-              <a:buFont typeface="Wingdings" charset="2"/>
-              <a:buChar char=""/>
-            </a:pPr>
-            <a:r>
-              <a:rPr b="0" lang="en-US" sz="2400" spc="-1" strike="noStrike">
-                <a:solidFill>
-                  <a:srgbClr val="050505"/>
-                </a:solidFill>
-                <a:latin typeface="Arial"/>
-                <a:ea typeface="DejaVu Sans"/>
-              </a:rPr>
-              <a:t>Used by Visual code and others</a:t>
+              <a:t>Used by Visual code, Atom, SproutCore and others</a:t>
             </a:r>
             <a:endParaRPr b="0" lang="en-US" sz="2400" spc="-1" strike="noStrike">
               <a:latin typeface="Arial"/>
@@ -6069,7 +6228,7 @@
         <p:spPr>
           <a:xfrm>
             <a:off x="1620000" y="216000"/>
-            <a:ext cx="8098920" cy="934920"/>
+            <a:ext cx="8097840" cy="933840"/>
           </a:xfrm>
           <a:prstGeom prst="rect">
             <a:avLst/>
@@ -6120,7 +6279,7 @@
         <p:spPr>
           <a:xfrm>
             <a:off x="1620000" y="1368000"/>
-            <a:ext cx="8098920" cy="3287160"/>
+            <a:ext cx="8097840" cy="3286080"/>
           </a:xfrm>
           <a:prstGeom prst="rect">
             <a:avLst/>
@@ -6141,7 +6300,7 @@
             <a:normAutofit/>
           </a:bodyPr>
           <a:p>
-            <a:pPr marL="432000" indent="-322920">
+            <a:pPr marL="432000" indent="-321840">
               <a:lnSpc>
                 <a:spcPct val="100000"/>
               </a:lnSpc>
@@ -6173,7 +6332,7 @@
                 <a:latin typeface="Arial"/>
                 <a:ea typeface="DejaVu Sans"/>
               </a:rPr>
-              <a:t>Doclets- Describes object </a:t>
+              <a:t>Doclets (JSDoc comment)- Describes an object </a:t>
             </a:r>
             <a:endParaRPr b="0" lang="en-US" sz="2400" spc="-1" strike="noStrike">
               <a:latin typeface="Arial"/>
@@ -6193,7 +6352,7 @@
             </a:endParaRPr>
           </a:p>
           <a:p>
-            <a:pPr marL="432000" indent="-322920">
+            <a:pPr marL="432000" indent="-321840">
               <a:lnSpc>
                 <a:spcPct val="100000"/>
               </a:lnSpc>
@@ -6215,33 +6374,27 @@
                 <a:latin typeface="Arial"/>
                 <a:ea typeface="DejaVu Sans"/>
               </a:rPr>
-              <a:t>Tag- Descibes objects’ component</a:t>
+              <a:t>Tag- Describes objects’ component</a:t>
             </a:r>
             <a:endParaRPr b="0" lang="en-US" sz="2400" spc="-1" strike="noStrike">
               <a:latin typeface="Arial"/>
             </a:endParaRPr>
           </a:p>
           <a:p>
-            <a:pPr marL="432000" indent="-322920">
-              <a:lnSpc>
-                <a:spcPct val="100000"/>
-              </a:lnSpc>
-              <a:spcAft>
-                <a:spcPts val="1060"/>
-              </a:spcAft>
-              <a:buClr>
-                <a:srgbClr val="0066ff"/>
-              </a:buClr>
-              <a:buSzPct val="40000"/>
-              <a:buFont typeface="Wingdings" charset="2"/>
-              <a:buChar char=""/>
+            <a:pPr>
+              <a:lnSpc>
+                <a:spcPct val="100000"/>
+              </a:lnSpc>
+              <a:spcAft>
+                <a:spcPts val="1060"/>
+              </a:spcAft>
             </a:pPr>
             <a:endParaRPr b="0" lang="en-US" sz="2400" spc="-1" strike="noStrike">
               <a:latin typeface="Arial"/>
             </a:endParaRPr>
           </a:p>
           <a:p>
-            <a:pPr marL="432000" indent="-322920">
+            <a:pPr marL="432000" indent="-321840">
               <a:lnSpc>
                 <a:spcPct val="100000"/>
               </a:lnSpc>
@@ -6342,7 +6495,7 @@
         <p:spPr>
           <a:xfrm>
             <a:off x="1620000" y="216000"/>
-            <a:ext cx="8098920" cy="934920"/>
+            <a:ext cx="8097840" cy="933840"/>
           </a:xfrm>
           <a:prstGeom prst="rect">
             <a:avLst/>
@@ -6376,7 +6529,7 @@
                 <a:latin typeface="Times New Roman"/>
                 <a:ea typeface="DejaVu Sans"/>
               </a:rPr>
-              <a:t>Doclets</a:t>
+              <a:t>Doclets </a:t>
             </a:r>
             <a:endParaRPr b="0" lang="en-US" sz="3300" spc="-1" strike="noStrike">
               <a:latin typeface="Arial"/>
@@ -6393,7 +6546,7 @@
         <p:spPr>
           <a:xfrm>
             <a:off x="1620000" y="1368000"/>
-            <a:ext cx="8098920" cy="3287160"/>
+            <a:ext cx="8097840" cy="3286080"/>
           </a:xfrm>
           <a:prstGeom prst="rect">
             <a:avLst/>
@@ -6414,7 +6567,7 @@
             <a:normAutofit/>
           </a:bodyPr>
           <a:p>
-            <a:pPr marL="432000" indent="-322920">
+            <a:pPr marL="432000" indent="-321840">
               <a:lnSpc>
                 <a:spcPct val="100000"/>
               </a:lnSpc>
@@ -6466,7 +6619,7 @@
             </a:endParaRPr>
           </a:p>
           <a:p>
-            <a:pPr marL="432000" indent="-322920">
+            <a:pPr marL="432000" indent="-321840">
               <a:lnSpc>
                 <a:spcPct val="100000"/>
               </a:lnSpc>
@@ -6508,7 +6661,7 @@
             </a:endParaRPr>
           </a:p>
           <a:p>
-            <a:pPr marL="432000" indent="-322920">
+            <a:pPr marL="432000" indent="-321840">
               <a:lnSpc>
                 <a:spcPct val="100000"/>
               </a:lnSpc>
@@ -6537,7 +6690,7 @@
             </a:endParaRPr>
           </a:p>
           <a:p>
-            <a:pPr lvl="1" marL="864000" indent="-322920">
+            <a:pPr lvl="1" marL="864000" indent="-321840">
               <a:lnSpc>
                 <a:spcPct val="100000"/>
               </a:lnSpc>
@@ -6699,7 +6852,7 @@
             </a:endParaRPr>
           </a:p>
           <a:p>
-            <a:pPr lvl="1" marL="864000" indent="-322920">
+            <a:pPr lvl="1" marL="864000" indent="-321840">
               <a:lnSpc>
                 <a:spcPct val="100000"/>
               </a:lnSpc>
@@ -6787,7 +6940,7 @@
         <p:spPr>
           <a:xfrm>
             <a:off x="1620000" y="216000"/>
-            <a:ext cx="8098920" cy="934920"/>
+            <a:ext cx="8097840" cy="933840"/>
           </a:xfrm>
           <a:prstGeom prst="rect">
             <a:avLst/>
@@ -6838,7 +6991,7 @@
         <p:spPr>
           <a:xfrm>
             <a:off x="1620000" y="1368000"/>
-            <a:ext cx="8098920" cy="3287160"/>
+            <a:ext cx="8097840" cy="3286080"/>
           </a:xfrm>
           <a:prstGeom prst="rect">
             <a:avLst/>
@@ -6859,7 +7012,7 @@
             <a:normAutofit/>
           </a:bodyPr>
           <a:p>
-            <a:pPr marL="432000" indent="-322920">
+            <a:pPr marL="432000" indent="-321840">
               <a:lnSpc>
                 <a:spcPct val="100000"/>
               </a:lnSpc>
@@ -6911,7 +7064,7 @@
             </a:endParaRPr>
           </a:p>
           <a:p>
-            <a:pPr marL="432000" indent="-322920">
+            <a:pPr marL="432000" indent="-321840">
               <a:lnSpc>
                 <a:spcPct val="100000"/>
               </a:lnSpc>
@@ -6983,7 +7136,7 @@
             </a:endParaRPr>
           </a:p>
           <a:p>
-            <a:pPr marL="432000" indent="-322920">
+            <a:pPr marL="432000" indent="-321840">
               <a:lnSpc>
                 <a:spcPct val="100000"/>
               </a:lnSpc>
@@ -7012,7 +7165,7 @@
             </a:endParaRPr>
           </a:p>
           <a:p>
-            <a:pPr lvl="2" marL="648000" indent="-215280">
+            <a:pPr lvl="2" marL="648000" indent="-214200">
               <a:lnSpc>
                 <a:spcPct val="100000"/>
               </a:lnSpc>
@@ -7100,7 +7253,7 @@
         <p:spPr>
           <a:xfrm>
             <a:off x="1620000" y="216000"/>
-            <a:ext cx="8098920" cy="934920"/>
+            <a:ext cx="8097840" cy="933840"/>
           </a:xfrm>
           <a:prstGeom prst="rect">
             <a:avLst/>
@@ -7151,7 +7304,7 @@
         <p:spPr>
           <a:xfrm>
             <a:off x="1620000" y="1368000"/>
-            <a:ext cx="8098920" cy="3287160"/>
+            <a:ext cx="8097840" cy="3286080"/>
           </a:xfrm>
           <a:prstGeom prst="rect">
             <a:avLst/>
@@ -7172,7 +7325,7 @@
             <a:normAutofit/>
           </a:bodyPr>
           <a:p>
-            <a:pPr marL="432000" indent="-322920">
+            <a:pPr marL="432000" indent="-321840">
               <a:lnSpc>
                 <a:spcPct val="100000"/>
               </a:lnSpc>
@@ -7187,7 +7340,7 @@
               <a:buChar char=""/>
             </a:pPr>
             <a:r>
-              <a:rPr b="0" lang="en-US" sz="2400" spc="-1" strike="noStrike">
+              <a:rPr b="0" lang="en-US" sz="2600" spc="-1" strike="noStrike">
                 <a:solidFill>
                   <a:srgbClr val="050505"/>
                 </a:solidFill>
@@ -7196,12 +7349,25 @@
               </a:rPr>
               <a:t>Generate HTML file from JSDoc comment</a:t>
             </a:r>
-            <a:endParaRPr b="0" lang="en-US" sz="2400" spc="-1" strike="noStrike">
-              <a:latin typeface="Arial"/>
-            </a:endParaRPr>
-          </a:p>
-          <a:p>
-            <a:pPr marL="432000" indent="-322920">
+            <a:endParaRPr b="0" lang="en-US" sz="2600" spc="-1" strike="noStrike">
+              <a:latin typeface="Arial"/>
+            </a:endParaRPr>
+          </a:p>
+          <a:p>
+            <a:pPr>
+              <a:lnSpc>
+                <a:spcPct val="100000"/>
+              </a:lnSpc>
+              <a:spcAft>
+                <a:spcPts val="1060"/>
+              </a:spcAft>
+            </a:pPr>
+            <a:endParaRPr b="0" lang="en-US" sz="2600" spc="-1" strike="noStrike">
+              <a:latin typeface="Arial"/>
+            </a:endParaRPr>
+          </a:p>
+          <a:p>
+            <a:pPr marL="432000" indent="-321840">
               <a:lnSpc>
                 <a:spcPct val="100000"/>
               </a:lnSpc>
@@ -7216,21 +7382,34 @@
               <a:buChar char=""/>
             </a:pPr>
             <a:r>
-              <a:rPr b="0" lang="en-US" sz="2400" spc="-1" strike="noStrike">
-                <a:solidFill>
-                  <a:srgbClr val="050505"/>
-                </a:solidFill>
-                <a:latin typeface="Arial"/>
-                <a:ea typeface="DejaVu Sans"/>
-              </a:rPr>
-              <a:t> </a:t>
-            </a:r>
-            <a:endParaRPr b="0" lang="en-US" sz="2400" spc="-1" strike="noStrike">
-              <a:latin typeface="Arial"/>
-            </a:endParaRPr>
-          </a:p>
-          <a:p>
-            <a:pPr marL="432000" indent="-322920">
+              <a:rPr b="0" lang="en-US" sz="2600" spc="-1" strike="noStrike">
+                <a:solidFill>
+                  <a:srgbClr val="050505"/>
+                </a:solidFill>
+                <a:latin typeface="Arial"/>
+                <a:ea typeface="DejaVu Sans"/>
+              </a:rPr>
+              <a:t>Standalone or ran by script (like in package.json)</a:t>
+            </a:r>
+            <a:endParaRPr b="0" lang="en-US" sz="2600" spc="-1" strike="noStrike">
+              <a:latin typeface="Arial"/>
+            </a:endParaRPr>
+          </a:p>
+          <a:p>
+            <a:pPr>
+              <a:lnSpc>
+                <a:spcPct val="100000"/>
+              </a:lnSpc>
+              <a:spcAft>
+                <a:spcPts val="1060"/>
+              </a:spcAft>
+            </a:pPr>
+            <a:endParaRPr b="0" lang="en-US" sz="2600" spc="-1" strike="noStrike">
+              <a:latin typeface="Arial"/>
+            </a:endParaRPr>
+          </a:p>
+          <a:p>
+            <a:pPr marL="432000" indent="-321840">
               <a:lnSpc>
                 <a:spcPct val="100000"/>
               </a:lnSpc>
@@ -7245,16 +7424,16 @@
               <a:buChar char=""/>
             </a:pPr>
             <a:r>
-              <a:rPr b="0" lang="en-US" sz="2400" spc="-1" strike="noStrike">
-                <a:solidFill>
-                  <a:srgbClr val="050505"/>
-                </a:solidFill>
-                <a:latin typeface="Arial"/>
-                <a:ea typeface="DejaVu Sans"/>
-              </a:rPr>
-              <a:t>Standalone or ran by script (like in package.json)</a:t>
-            </a:r>
-            <a:endParaRPr b="0" lang="en-US" sz="2400" spc="-1" strike="noStrike">
+              <a:rPr b="0" lang="en-US" sz="2600" spc="-1" strike="noStrike">
+                <a:solidFill>
+                  <a:srgbClr val="050505"/>
+                </a:solidFill>
+                <a:latin typeface="Arial"/>
+                <a:ea typeface="DejaVu Sans"/>
+              </a:rPr>
+              <a:t>Examples- jsdoc (itself), document.js, esdoc </a:t>
+            </a:r>
+            <a:endParaRPr b="0" lang="en-US" sz="2600" spc="-1" strike="noStrike">
               <a:latin typeface="Arial"/>
             </a:endParaRPr>
           </a:p>
@@ -7267,78 +7446,7 @@
                 <a:spcPts val="1060"/>
               </a:spcAft>
             </a:pPr>
-            <a:endParaRPr b="0" lang="en-US" sz="2400" spc="-1" strike="noStrike">
-              <a:latin typeface="Arial"/>
-            </a:endParaRPr>
-          </a:p>
-          <a:p>
-            <a:pPr marL="432000" indent="-322920">
-              <a:lnSpc>
-                <a:spcPct val="100000"/>
-              </a:lnSpc>
-              <a:spcAft>
-                <a:spcPts val="1060"/>
-              </a:spcAft>
-              <a:buClr>
-                <a:srgbClr val="0066ff"/>
-              </a:buClr>
-              <a:buSzPct val="40000"/>
-              <a:buFont typeface="Wingdings" charset="2"/>
-              <a:buChar char=""/>
-            </a:pPr>
-            <a:r>
-              <a:rPr b="0" lang="en-US" sz="2400" spc="-1" strike="noStrike">
-                <a:solidFill>
-                  <a:srgbClr val="050505"/>
-                </a:solidFill>
-                <a:latin typeface="Arial"/>
-                <a:ea typeface="DejaVu Sans"/>
-              </a:rPr>
-              <a:t>Examples- jsdoc (itself), document.js, esdoc </a:t>
-            </a:r>
-            <a:endParaRPr b="0" lang="en-US" sz="2400" spc="-1" strike="noStrike">
-              <a:latin typeface="Arial"/>
-            </a:endParaRPr>
-          </a:p>
-          <a:p>
-            <a:pPr>
-              <a:lnSpc>
-                <a:spcPct val="100000"/>
-              </a:lnSpc>
-              <a:spcAft>
-                <a:spcPts val="1060"/>
-              </a:spcAft>
-            </a:pPr>
-            <a:endParaRPr b="0" lang="en-US" sz="2400" spc="-1" strike="noStrike">
-              <a:latin typeface="Arial"/>
-            </a:endParaRPr>
-          </a:p>
-          <a:p>
-            <a:pPr marL="432000" indent="-322920">
-              <a:lnSpc>
-                <a:spcPct val="100000"/>
-              </a:lnSpc>
-              <a:spcAft>
-                <a:spcPts val="1060"/>
-              </a:spcAft>
-              <a:buClr>
-                <a:srgbClr val="0066ff"/>
-              </a:buClr>
-              <a:buSzPct val="40000"/>
-              <a:buFont typeface="Wingdings" charset="2"/>
-              <a:buChar char=""/>
-            </a:pPr>
-            <a:r>
-              <a:rPr b="0" lang="en-US" sz="2400" spc="-1" strike="noStrike">
-                <a:solidFill>
-                  <a:srgbClr val="050505"/>
-                </a:solidFill>
-                <a:latin typeface="Arial"/>
-                <a:ea typeface="DejaVu Sans"/>
-              </a:rPr>
-              <a:t>Detailed discussion beyond scope of this talk</a:t>
-            </a:r>
-            <a:endParaRPr b="0" lang="en-US" sz="2400" spc="-1" strike="noStrike">
+            <a:endParaRPr b="0" lang="en-US" sz="2600" spc="-1" strike="noStrike">
               <a:latin typeface="Arial"/>
             </a:endParaRPr>
           </a:p>
@@ -7402,7 +7510,7 @@
         <p:spPr>
           <a:xfrm>
             <a:off x="1620000" y="216000"/>
-            <a:ext cx="8098920" cy="934920"/>
+            <a:ext cx="8097840" cy="933840"/>
           </a:xfrm>
           <a:prstGeom prst="rect">
             <a:avLst/>
@@ -7453,7 +7561,7 @@
         <p:spPr>
           <a:xfrm>
             <a:off x="1620000" y="1368000"/>
-            <a:ext cx="8098920" cy="3287160"/>
+            <a:ext cx="8097840" cy="3286080"/>
           </a:xfrm>
           <a:prstGeom prst="rect">
             <a:avLst/>
@@ -7474,7 +7582,7 @@
             <a:normAutofit/>
           </a:bodyPr>
           <a:p>
-            <a:pPr marL="432000" indent="-322920">
+            <a:pPr marL="432000" indent="-321840">
               <a:lnSpc>
                 <a:spcPct val="100000"/>
               </a:lnSpc>
@@ -7503,7 +7611,7 @@
             </a:endParaRPr>
           </a:p>
           <a:p>
-            <a:pPr lvl="1" marL="864000" indent="-322920">
+            <a:pPr lvl="1" marL="864000" indent="-321840">
               <a:lnSpc>
                 <a:spcPct val="100000"/>
               </a:lnSpc>
@@ -7532,7 +7640,7 @@
             </a:endParaRPr>
           </a:p>
           <a:p>
-            <a:pPr lvl="1" marL="864000" indent="-322920">
+            <a:pPr lvl="1" marL="864000" indent="-321840">
               <a:lnSpc>
                 <a:spcPct val="100000"/>
               </a:lnSpc>
@@ -7566,7 +7674,7 @@
                 <a:spcPct val="100000"/>
               </a:lnSpc>
               <a:spcAft>
-                <a:spcPts val="848"/>
+                <a:spcPts val="1060"/>
               </a:spcAft>
             </a:pPr>
             <a:endParaRPr b="0" lang="en-US" sz="2090" spc="-1" strike="noStrike">
@@ -7574,20 +7682,7 @@
             </a:endParaRPr>
           </a:p>
           <a:p>
-            <a:pPr>
-              <a:lnSpc>
-                <a:spcPct val="100000"/>
-              </a:lnSpc>
-              <a:spcAft>
-                <a:spcPts val="1060"/>
-              </a:spcAft>
-            </a:pPr>
-            <a:endParaRPr b="0" lang="en-US" sz="2090" spc="-1" strike="noStrike">
-              <a:latin typeface="Arial"/>
-            </a:endParaRPr>
-          </a:p>
-          <a:p>
-            <a:pPr marL="432000" indent="-322920">
+            <a:pPr marL="432000" indent="-321840">
               <a:lnSpc>
                 <a:spcPct val="100000"/>
               </a:lnSpc>
@@ -7616,7 +7711,20 @@
             </a:endParaRPr>
           </a:p>
           <a:p>
-            <a:pPr marL="432000" indent="-322920">
+            <a:pPr>
+              <a:lnSpc>
+                <a:spcPct val="100000"/>
+              </a:lnSpc>
+              <a:spcAft>
+                <a:spcPts val="1060"/>
+              </a:spcAft>
+            </a:pPr>
+            <a:endParaRPr b="0" lang="en-US" sz="2400" spc="-1" strike="noStrike">
+              <a:latin typeface="Arial"/>
+            </a:endParaRPr>
+          </a:p>
+          <a:p>
+            <a:pPr marL="432000" indent="-321840">
               <a:lnSpc>
                 <a:spcPct val="100000"/>
               </a:lnSpc>
@@ -7630,25 +7738,6 @@
               <a:buFont typeface="Wingdings" charset="2"/>
               <a:buChar char=""/>
             </a:pPr>
-            <a:endParaRPr b="0" lang="en-US" sz="2400" spc="-1" strike="noStrike">
-              <a:latin typeface="Arial"/>
-            </a:endParaRPr>
-          </a:p>
-          <a:p>
-            <a:pPr marL="432000" indent="-322920">
-              <a:lnSpc>
-                <a:spcPct val="100000"/>
-              </a:lnSpc>
-              <a:spcAft>
-                <a:spcPts val="1060"/>
-              </a:spcAft>
-              <a:buClr>
-                <a:srgbClr val="0066ff"/>
-              </a:buClr>
-              <a:buSzPct val="40000"/>
-              <a:buFont typeface="Wingdings" charset="2"/>
-              <a:buChar char=""/>
-            </a:pPr>
             <a:r>
               <a:rPr b="0" lang="en-US" sz="2400" spc="-1" strike="noStrike">
                 <a:solidFill>
@@ -7657,7 +7746,27 @@
                 <a:latin typeface="Arial"/>
                 <a:ea typeface="DejaVu Sans"/>
               </a:rPr>
-              <a:t>Phil, do the code demo</a:t>
+              <a:t>Phil, </a:t>
+            </a:r>
+            <a:r>
+              <a:rPr b="1" lang="en-US" sz="2400" spc="-1" strike="noStrike">
+                <a:solidFill>
+                  <a:srgbClr val="050505"/>
+                </a:solidFill>
+                <a:latin typeface="Arial"/>
+                <a:ea typeface="DejaVu Sans"/>
+              </a:rPr>
+              <a:t>NOW </a:t>
+            </a:r>
+            <a:r>
+              <a:rPr b="0" lang="en-US" sz="2400" spc="-1" strike="noStrike">
+                <a:solidFill>
+                  <a:srgbClr val="050505"/>
+                </a:solidFill>
+                <a:latin typeface="Arial"/>
+                <a:ea typeface="DejaVu Sans"/>
+              </a:rPr>
+              <a:t>do the code demo</a:t>
             </a:r>
             <a:endParaRPr b="0" lang="en-US" sz="2400" spc="-1" strike="noStrike">
               <a:latin typeface="Arial"/>
@@ -7749,7 +7858,7 @@
         <p:spPr>
           <a:xfrm>
             <a:off x="1620000" y="216000"/>
-            <a:ext cx="8098920" cy="934920"/>
+            <a:ext cx="8097840" cy="933840"/>
           </a:xfrm>
           <a:prstGeom prst="rect">
             <a:avLst/>
@@ -7783,7 +7892,7 @@
                 <a:latin typeface="Times New Roman"/>
                 <a:ea typeface="DejaVu Sans"/>
               </a:rPr>
-              <a:t>Gotcha</a:t>
+              <a:t>Gotcha’s</a:t>
             </a:r>
             <a:endParaRPr b="0" lang="en-US" sz="3300" spc="-1" strike="noStrike">
               <a:latin typeface="Arial"/>
@@ -7800,7 +7909,7 @@
         <p:spPr>
           <a:xfrm>
             <a:off x="1620000" y="1368000"/>
-            <a:ext cx="8098920" cy="3287160"/>
+            <a:ext cx="8097840" cy="3286080"/>
           </a:xfrm>
           <a:prstGeom prst="rect">
             <a:avLst/>
@@ -7821,7 +7930,7 @@
             <a:normAutofit/>
           </a:bodyPr>
           <a:p>
-            <a:pPr marL="432000" indent="-322920">
+            <a:pPr marL="432000" indent="-321840">
               <a:lnSpc>
                 <a:spcPct val="100000"/>
               </a:lnSpc>
@@ -7850,7 +7959,7 @@
             </a:endParaRPr>
           </a:p>
           <a:p>
-            <a:pPr marL="432000" indent="-322920">
+            <a:pPr marL="432000" indent="-321840">
               <a:lnSpc>
                 <a:spcPct val="100000"/>
               </a:lnSpc>
@@ -7864,12 +7973,22 @@
               <a:buFont typeface="Wingdings" charset="2"/>
               <a:buChar char=""/>
             </a:pPr>
+            <a:r>
+              <a:rPr b="0" lang="en-US" sz="2400" spc="-1" strike="noStrike">
+                <a:solidFill>
+                  <a:srgbClr val="050505"/>
+                </a:solidFill>
+                <a:latin typeface="Arial"/>
+                <a:ea typeface="DejaVu Sans"/>
+              </a:rPr>
+              <a:t>Other libraries use Doclets (JSDoc comment) like ESDoc</a:t>
+            </a:r>
             <a:endParaRPr b="0" lang="en-US" sz="2400" spc="-1" strike="noStrike">
               <a:latin typeface="Arial"/>
             </a:endParaRPr>
           </a:p>
           <a:p>
-            <a:pPr marL="432000" indent="-322920">
+            <a:pPr marL="432000" indent="-321840">
               <a:lnSpc>
                 <a:spcPct val="100000"/>
               </a:lnSpc>
@@ -7891,14 +8010,14 @@
                 <a:latin typeface="Arial"/>
                 <a:ea typeface="DejaVu Sans"/>
               </a:rPr>
-              <a:t>Apparently no standard on when to use tags</a:t>
+              <a:t>Many tags not covered</a:t>
             </a:r>
             <a:endParaRPr b="0" lang="en-US" sz="2400" spc="-1" strike="noStrike">
               <a:latin typeface="Arial"/>
             </a:endParaRPr>
           </a:p>
           <a:p>
-            <a:pPr marL="432000" indent="-322920">
+            <a:pPr marL="432000" indent="-321840">
               <a:lnSpc>
                 <a:spcPct val="100000"/>
               </a:lnSpc>
@@ -7912,12 +8031,22 @@
               <a:buFont typeface="Wingdings" charset="2"/>
               <a:buChar char=""/>
             </a:pPr>
+            <a:r>
+              <a:rPr b="0" lang="en-US" sz="2400" spc="-1" strike="noStrike">
+                <a:solidFill>
+                  <a:srgbClr val="050505"/>
+                </a:solidFill>
+                <a:latin typeface="Arial"/>
+                <a:ea typeface="DejaVu Sans"/>
+              </a:rPr>
+              <a:t>Apparently no standard on when to use tag</a:t>
+            </a:r>
             <a:endParaRPr b="0" lang="en-US" sz="2400" spc="-1" strike="noStrike">
               <a:latin typeface="Arial"/>
             </a:endParaRPr>
           </a:p>
           <a:p>
-            <a:pPr marL="432000" indent="-322920">
+            <a:pPr marL="432000" indent="-321840">
               <a:lnSpc>
                 <a:spcPct val="100000"/>
               </a:lnSpc>
@@ -7939,14 +8068,14 @@
                 <a:latin typeface="Arial"/>
                 <a:ea typeface="DejaVu Sans"/>
               </a:rPr>
-              <a:t>JSDoc originally built for ES3 and ES5 </a:t>
+              <a:t>Has syntax that arguably is specific to ES3 and ES5 </a:t>
             </a:r>
             <a:endParaRPr b="0" lang="en-US" sz="2400" spc="-1" strike="noStrike">
               <a:latin typeface="Arial"/>
             </a:endParaRPr>
           </a:p>
           <a:p>
-            <a:pPr lvl="1" marL="864000" indent="-322920">
+            <a:pPr lvl="1" marL="864000" indent="-321840">
               <a:lnSpc>
                 <a:spcPct val="100000"/>
               </a:lnSpc>
@@ -7975,7 +8104,7 @@
             </a:endParaRPr>
           </a:p>
           <a:p>
-            <a:pPr lvl="1" marL="864000" indent="-322920">
+            <a:pPr lvl="1" marL="864000" indent="-321840">
               <a:lnSpc>
                 <a:spcPct val="100000"/>
               </a:lnSpc>

</xml_diff>

<commit_message>
last minute tweak, nothing significant
</commit_message>
<xml_diff>
--- a/slides.pptx
+++ b/slides.pptx
@@ -2722,7 +2722,7 @@
         <p:spPr>
           <a:xfrm>
             <a:off x="0" y="0"/>
-            <a:ext cx="10083600" cy="5667840"/>
+            <a:ext cx="10082880" cy="5667120"/>
           </a:xfrm>
           <a:prstGeom prst="rect">
             <a:avLst/>
@@ -2996,7 +2996,7 @@
         <p:spPr>
           <a:xfrm>
             <a:off x="0" y="0"/>
-            <a:ext cx="10083600" cy="5667840"/>
+            <a:ext cx="10082880" cy="5667120"/>
           </a:xfrm>
           <a:prstGeom prst="rect">
             <a:avLst/>
@@ -3266,7 +3266,7 @@
         <p:spPr>
           <a:xfrm>
             <a:off x="1501200" y="216000"/>
-            <a:ext cx="8097840" cy="933840"/>
+            <a:ext cx="8097120" cy="933120"/>
           </a:xfrm>
           <a:prstGeom prst="rect">
             <a:avLst/>
@@ -3292,7 +3292,7 @@
         <p:spPr>
           <a:xfrm>
             <a:off x="1620000" y="1368000"/>
-            <a:ext cx="8097840" cy="3286080"/>
+            <a:ext cx="8097120" cy="3285360"/>
           </a:xfrm>
           <a:prstGeom prst="rect">
             <a:avLst/>
@@ -3450,7 +3450,7 @@
         <p:spPr>
           <a:xfrm>
             <a:off x="1620000" y="216000"/>
-            <a:ext cx="8097840" cy="933840"/>
+            <a:ext cx="8097120" cy="933120"/>
           </a:xfrm>
           <a:prstGeom prst="rect">
             <a:avLst/>
@@ -3501,7 +3501,7 @@
         <p:spPr>
           <a:xfrm>
             <a:off x="1620000" y="1368000"/>
-            <a:ext cx="8097840" cy="3286080"/>
+            <a:ext cx="8097120" cy="3285360"/>
           </a:xfrm>
           <a:prstGeom prst="rect">
             <a:avLst/>
@@ -3522,7 +3522,7 @@
             <a:normAutofit/>
           </a:bodyPr>
           <a:p>
-            <a:pPr marL="432000" indent="-321840">
+            <a:pPr marL="432000" indent="-321120">
               <a:lnSpc>
                 <a:spcPct val="100000"/>
               </a:lnSpc>
@@ -3551,7 +3551,7 @@
             </a:endParaRPr>
           </a:p>
           <a:p>
-            <a:pPr marL="432000" indent="-321840">
+            <a:pPr marL="432000" indent="-321120">
               <a:lnSpc>
                 <a:spcPct val="100000"/>
               </a:lnSpc>
@@ -3590,7 +3590,7 @@
             </a:endParaRPr>
           </a:p>
           <a:p>
-            <a:pPr marL="432000" indent="-321840">
+            <a:pPr marL="432000" indent="-321120">
               <a:lnSpc>
                 <a:spcPct val="100000"/>
               </a:lnSpc>
@@ -3629,7 +3629,7 @@
             </a:endParaRPr>
           </a:p>
           <a:p>
-            <a:pPr marL="432000" indent="-321840">
+            <a:pPr marL="432000" indent="-321120">
               <a:lnSpc>
                 <a:spcPct val="100000"/>
               </a:lnSpc>
@@ -3644,6 +3644,16 @@
               <a:buChar char=""/>
             </a:pPr>
             <a:r>
+              <a:rPr b="1" lang="en-US" sz="2400" spc="-1" strike="noStrike">
+                <a:solidFill>
+                  <a:srgbClr val="050505"/>
+                </a:solidFill>
+                <a:latin typeface="Arial"/>
+                <a:ea typeface="DejaVu Sans"/>
+              </a:rPr>
+              <a:t>Type annotation</a:t>
+            </a:r>
+            <a:r>
               <a:rPr b="0" lang="en-US" sz="2400" spc="-1" strike="noStrike">
                 <a:solidFill>
                   <a:srgbClr val="050505"/>
@@ -3651,14 +3661,14 @@
                 <a:latin typeface="Arial"/>
                 <a:ea typeface="DejaVu Sans"/>
               </a:rPr>
-              <a:t>Generate markdown (md)</a:t>
+              <a:t> and various parameters</a:t>
             </a:r>
             <a:endParaRPr b="0" lang="en-US" sz="2400" spc="-1" strike="noStrike">
               <a:latin typeface="Arial"/>
             </a:endParaRPr>
           </a:p>
           <a:p>
-            <a:pPr marL="432000" indent="-321840">
+            <a:pPr marL="432000" indent="-321120">
               <a:lnSpc>
                 <a:spcPct val="100000"/>
               </a:lnSpc>
@@ -3673,6 +3683,35 @@
               <a:buChar char=""/>
             </a:pPr>
             <a:r>
+              <a:rPr b="1" lang="en-US" sz="2400" spc="-1" strike="noStrike">
+                <a:solidFill>
+                  <a:srgbClr val="050505"/>
+                </a:solidFill>
+                <a:latin typeface="Arial"/>
+                <a:ea typeface="DejaVu Sans"/>
+              </a:rPr>
+              <a:t>Eslinting and coverage</a:t>
+            </a:r>
+            <a:endParaRPr b="0" lang="en-US" sz="2400" spc="-1" strike="noStrike">
+              <a:latin typeface="Arial"/>
+            </a:endParaRPr>
+          </a:p>
+          <a:p>
+            <a:pPr marL="432000" indent="-321120">
+              <a:lnSpc>
+                <a:spcPct val="100000"/>
+              </a:lnSpc>
+              <a:spcAft>
+                <a:spcPts val="1060"/>
+              </a:spcAft>
+              <a:buClr>
+                <a:srgbClr val="0066ff"/>
+              </a:buClr>
+              <a:buSzPct val="40000"/>
+              <a:buFont typeface="Wingdings" charset="2"/>
+              <a:buChar char=""/>
+            </a:pPr>
+            <a:r>
               <a:rPr b="0" lang="en-US" sz="2400" spc="-1" strike="noStrike">
                 <a:solidFill>
                   <a:srgbClr val="050505"/>
@@ -3680,6 +3719,35 @@
                 <a:latin typeface="Arial"/>
                 <a:ea typeface="DejaVu Sans"/>
               </a:rPr>
+              <a:t>Generate markdown (md)</a:t>
+            </a:r>
+            <a:endParaRPr b="0" lang="en-US" sz="2400" spc="-1" strike="noStrike">
+              <a:latin typeface="Arial"/>
+            </a:endParaRPr>
+          </a:p>
+          <a:p>
+            <a:pPr marL="432000" indent="-321120">
+              <a:lnSpc>
+                <a:spcPct val="100000"/>
+              </a:lnSpc>
+              <a:spcAft>
+                <a:spcPts val="1060"/>
+              </a:spcAft>
+              <a:buClr>
+                <a:srgbClr val="0066ff"/>
+              </a:buClr>
+              <a:buSzPct val="40000"/>
+              <a:buFont typeface="Wingdings" charset="2"/>
+              <a:buChar char=""/>
+            </a:pPr>
+            <a:r>
+              <a:rPr b="0" lang="en-US" sz="2400" spc="-1" strike="noStrike">
+                <a:solidFill>
+                  <a:srgbClr val="050505"/>
+                </a:solidFill>
+                <a:latin typeface="Arial"/>
+                <a:ea typeface="DejaVu Sans"/>
+              </a:rPr>
               <a:t>Synonyms (like abstract and virtual)</a:t>
             </a:r>
             <a:endParaRPr b="0" lang="en-US" sz="2400" spc="-1" strike="noStrike">
@@ -3687,7 +3755,7 @@
             </a:endParaRPr>
           </a:p>
           <a:p>
-            <a:pPr marL="432000" indent="-321840">
+            <a:pPr marL="432000" indent="-321120">
               <a:lnSpc>
                 <a:spcPct val="100000"/>
               </a:lnSpc>
@@ -3801,7 +3869,7 @@
         <p:spPr>
           <a:xfrm>
             <a:off x="1620000" y="216000"/>
-            <a:ext cx="8097840" cy="933840"/>
+            <a:ext cx="8097120" cy="933120"/>
           </a:xfrm>
           <a:prstGeom prst="rect">
             <a:avLst/>
@@ -3852,7 +3920,7 @@
         <p:spPr>
           <a:xfrm>
             <a:off x="1620000" y="1368000"/>
-            <a:ext cx="8097840" cy="3286080"/>
+            <a:ext cx="8097120" cy="3285360"/>
           </a:xfrm>
           <a:prstGeom prst="rect">
             <a:avLst/>
@@ -3873,7 +3941,7 @@
             <a:normAutofit/>
           </a:bodyPr>
           <a:p>
-            <a:pPr marL="432000" indent="-321840">
+            <a:pPr marL="432000" indent="-321120">
               <a:lnSpc>
                 <a:spcPct val="100000"/>
               </a:lnSpc>
@@ -3915,7 +3983,7 @@
             </a:endParaRPr>
           </a:p>
           <a:p>
-            <a:pPr marL="432000" indent="-321840">
+            <a:pPr marL="432000" indent="-321120">
               <a:lnSpc>
                 <a:spcPct val="100000"/>
               </a:lnSpc>
@@ -3944,7 +4012,7 @@
             </a:endParaRPr>
           </a:p>
           <a:p>
-            <a:pPr lvl="2" marL="648000" indent="-215640">
+            <a:pPr lvl="2" marL="648000" indent="-214920">
               <a:lnSpc>
                 <a:spcPct val="100000"/>
               </a:lnSpc>
@@ -3973,7 +4041,7 @@
             </a:endParaRPr>
           </a:p>
           <a:p>
-            <a:pPr lvl="2" marL="648000" indent="-215640">
+            <a:pPr lvl="2" marL="648000" indent="-214920">
               <a:lnSpc>
                 <a:spcPct val="100000"/>
               </a:lnSpc>
@@ -3995,14 +4063,14 @@
                 <a:latin typeface="Arial"/>
                 <a:ea typeface="DejaVu Sans"/>
               </a:rPr>
-              <a:t>We do not do Machine Learning</a:t>
+              <a:t>Not a Machine Learning Research Group</a:t>
             </a:r>
             <a:endParaRPr b="0" lang="en-US" sz="2400" spc="-1" strike="noStrike">
               <a:latin typeface="Arial"/>
             </a:endParaRPr>
           </a:p>
           <a:p>
-            <a:pPr lvl="2" marL="648000" indent="-215640">
+            <a:pPr lvl="2" marL="648000" indent="-214920">
               <a:lnSpc>
                 <a:spcPct val="100000"/>
               </a:lnSpc>
@@ -4024,7 +4092,7 @@
                 <a:latin typeface="Arial"/>
                 <a:ea typeface="DejaVu Sans"/>
               </a:rPr>
-              <a:t>This is not a Machine Learning talk</a:t>
+              <a:t>This is not a Machine Learning talk!</a:t>
             </a:r>
             <a:endParaRPr b="0" lang="en-US" sz="2400" spc="-1" strike="noStrike">
               <a:latin typeface="Arial"/>
@@ -4103,7 +4171,7 @@
         <p:spPr>
           <a:xfrm>
             <a:off x="1620000" y="216000"/>
-            <a:ext cx="8097840" cy="933840"/>
+            <a:ext cx="8097120" cy="933120"/>
           </a:xfrm>
           <a:prstGeom prst="rect">
             <a:avLst/>
@@ -4154,7 +4222,7 @@
         <p:spPr>
           <a:xfrm>
             <a:off x="1620000" y="1368000"/>
-            <a:ext cx="8097840" cy="3933360"/>
+            <a:ext cx="8097120" cy="3932640"/>
           </a:xfrm>
           <a:prstGeom prst="rect">
             <a:avLst/>
@@ -4175,7 +4243,7 @@
             <a:normAutofit/>
           </a:bodyPr>
           <a:p>
-            <a:pPr marL="432000" indent="-321840">
+            <a:pPr marL="432000" indent="-321120">
               <a:lnSpc>
                 <a:spcPct val="100000"/>
               </a:lnSpc>
@@ -4204,7 +4272,7 @@
             </a:endParaRPr>
           </a:p>
           <a:p>
-            <a:pPr lvl="1" marL="864000" indent="-321840">
+            <a:pPr lvl="1" marL="864000" indent="-321120">
               <a:lnSpc>
                 <a:spcPct val="100000"/>
               </a:lnSpc>
@@ -4233,7 +4301,7 @@
             </a:endParaRPr>
           </a:p>
           <a:p>
-            <a:pPr lvl="1" marL="864000" indent="-321840">
+            <a:pPr lvl="1" marL="864000" indent="-321120">
               <a:lnSpc>
                 <a:spcPct val="100000"/>
               </a:lnSpc>
@@ -4262,7 +4330,7 @@
             </a:endParaRPr>
           </a:p>
           <a:p>
-            <a:pPr lvl="1" marL="864000" indent="-321840">
+            <a:pPr lvl="1" marL="864000" indent="-321120">
               <a:lnSpc>
                 <a:spcPct val="100000"/>
               </a:lnSpc>
@@ -4405,7 +4473,7 @@
             </a:endParaRPr>
           </a:p>
           <a:p>
-            <a:pPr marL="432000" indent="-321840">
+            <a:pPr marL="432000" indent="-321120">
               <a:lnSpc>
                 <a:spcPct val="100000"/>
               </a:lnSpc>
@@ -4493,7 +4561,7 @@
         <p:spPr>
           <a:xfrm>
             <a:off x="1620000" y="216000"/>
-            <a:ext cx="8097840" cy="933840"/>
+            <a:ext cx="8097120" cy="933120"/>
           </a:xfrm>
           <a:prstGeom prst="rect">
             <a:avLst/>
@@ -4544,7 +4612,7 @@
         <p:spPr>
           <a:xfrm>
             <a:off x="1620000" y="1368000"/>
-            <a:ext cx="8097840" cy="3286080"/>
+            <a:ext cx="8097120" cy="3285360"/>
           </a:xfrm>
           <a:prstGeom prst="rect">
             <a:avLst/>
@@ -4565,7 +4633,7 @@
             <a:normAutofit/>
           </a:bodyPr>
           <a:p>
-            <a:pPr marL="432000" indent="-321840">
+            <a:pPr marL="432000" indent="-321120">
               <a:lnSpc>
                 <a:spcPct val="100000"/>
               </a:lnSpc>
@@ -4594,7 +4662,7 @@
             </a:endParaRPr>
           </a:p>
           <a:p>
-            <a:pPr lvl="1" marL="864000" indent="-321840">
+            <a:pPr lvl="1" marL="864000" indent="-321120">
               <a:lnSpc>
                 <a:spcPct val="100000"/>
               </a:lnSpc>
@@ -4623,7 +4691,7 @@
             </a:endParaRPr>
           </a:p>
           <a:p>
-            <a:pPr lvl="1" marL="864000" indent="-321840">
+            <a:pPr lvl="1" marL="864000" indent="-321120">
               <a:lnSpc>
                 <a:spcPct val="100000"/>
               </a:lnSpc>
@@ -4652,7 +4720,7 @@
             </a:endParaRPr>
           </a:p>
           <a:p>
-            <a:pPr lvl="1" marL="864000" indent="-321840">
+            <a:pPr lvl="1" marL="864000" indent="-321120">
               <a:lnSpc>
                 <a:spcPct val="100000"/>
               </a:lnSpc>
@@ -4694,7 +4762,7 @@
             </a:endParaRPr>
           </a:p>
           <a:p>
-            <a:pPr marL="432000" indent="-321840">
+            <a:pPr marL="432000" indent="-321120">
               <a:lnSpc>
                 <a:spcPct val="100000"/>
               </a:lnSpc>
@@ -4723,7 +4791,7 @@
             </a:endParaRPr>
           </a:p>
           <a:p>
-            <a:pPr lvl="1" marL="864000" indent="-321840">
+            <a:pPr lvl="1" marL="864000" indent="-321120">
               <a:lnSpc>
                 <a:spcPct val="100000"/>
               </a:lnSpc>
@@ -4765,7 +4833,7 @@
             </a:endParaRPr>
           </a:p>
           <a:p>
-            <a:pPr marL="432000" indent="-321840">
+            <a:pPr marL="432000" indent="-321120">
               <a:lnSpc>
                 <a:spcPct val="100000"/>
               </a:lnSpc>
@@ -4853,7 +4921,7 @@
         <p:spPr>
           <a:xfrm>
             <a:off x="1620000" y="216000"/>
-            <a:ext cx="8097840" cy="933840"/>
+            <a:ext cx="8097120" cy="933120"/>
           </a:xfrm>
           <a:prstGeom prst="rect">
             <a:avLst/>
@@ -4904,7 +4972,7 @@
         <p:spPr>
           <a:xfrm>
             <a:off x="1620000" y="1368000"/>
-            <a:ext cx="8097840" cy="3286080"/>
+            <a:ext cx="8097120" cy="3285360"/>
           </a:xfrm>
           <a:prstGeom prst="rect">
             <a:avLst/>
@@ -4925,7 +4993,7 @@
             <a:normAutofit/>
           </a:bodyPr>
           <a:p>
-            <a:pPr marL="432000" indent="-321840">
+            <a:pPr marL="432000" indent="-321120">
               <a:lnSpc>
                 <a:spcPct val="100000"/>
               </a:lnSpc>
@@ -4954,7 +5022,20 @@
             </a:endParaRPr>
           </a:p>
           <a:p>
-            <a:pPr marL="432000" indent="-321840">
+            <a:pPr>
+              <a:lnSpc>
+                <a:spcPct val="100000"/>
+              </a:lnSpc>
+              <a:spcAft>
+                <a:spcPts val="1060"/>
+              </a:spcAft>
+            </a:pPr>
+            <a:endParaRPr b="0" lang="en-US" sz="2400" spc="-1" strike="noStrike">
+              <a:latin typeface="Arial"/>
+            </a:endParaRPr>
+          </a:p>
+          <a:p>
+            <a:pPr marL="432000" indent="-321120">
               <a:lnSpc>
                 <a:spcPct val="100000"/>
               </a:lnSpc>
@@ -4968,12 +5049,35 @@
               <a:buFont typeface="Wingdings" charset="2"/>
               <a:buChar char=""/>
             </a:pPr>
+            <a:r>
+              <a:rPr b="0" lang="en-US" sz="2400" spc="-1" strike="noStrike">
+                <a:solidFill>
+                  <a:srgbClr val="050505"/>
+                </a:solidFill>
+                <a:latin typeface="Arial"/>
+                <a:ea typeface="DejaVu Sans"/>
+              </a:rPr>
+              <a:t>Overview of Artificial Intelligence/Machine Learning</a:t>
+            </a:r>
             <a:endParaRPr b="0" lang="en-US" sz="2400" spc="-1" strike="noStrike">
               <a:latin typeface="Arial"/>
             </a:endParaRPr>
           </a:p>
           <a:p>
-            <a:pPr marL="432000" indent="-321840">
+            <a:pPr>
+              <a:lnSpc>
+                <a:spcPct val="100000"/>
+              </a:lnSpc>
+              <a:spcAft>
+                <a:spcPts val="1060"/>
+              </a:spcAft>
+            </a:pPr>
+            <a:endParaRPr b="0" lang="en-US" sz="2400" spc="-1" strike="noStrike">
+              <a:latin typeface="Arial"/>
+            </a:endParaRPr>
+          </a:p>
+          <a:p>
+            <a:pPr marL="432000" indent="-321120">
               <a:lnSpc>
                 <a:spcPct val="100000"/>
               </a:lnSpc>
@@ -4995,7 +5099,7 @@
                 <a:latin typeface="Arial"/>
                 <a:ea typeface="DejaVu Sans"/>
               </a:rPr>
-              <a:t>Overview of Artificial Intelligence</a:t>
+              <a:t>Demo or literature review of Machine Learning usage in Genomics</a:t>
             </a:r>
             <a:endParaRPr b="0" lang="en-US" sz="2400" spc="-1" strike="noStrike">
               <a:latin typeface="Arial"/>
@@ -5015,49 +5119,7 @@
             </a:endParaRPr>
           </a:p>
           <a:p>
-            <a:pPr marL="432000" indent="-321840">
-              <a:lnSpc>
-                <a:spcPct val="100000"/>
-              </a:lnSpc>
-              <a:spcAft>
-                <a:spcPts val="1060"/>
-              </a:spcAft>
-              <a:buClr>
-                <a:srgbClr val="0066ff"/>
-              </a:buClr>
-              <a:buSzPct val="40000"/>
-              <a:buFont typeface="Wingdings" charset="2"/>
-              <a:buChar char=""/>
-            </a:pPr>
-            <a:r>
-              <a:rPr b="0" lang="en-US" sz="2400" spc="-1" strike="noStrike">
-                <a:solidFill>
-                  <a:srgbClr val="050505"/>
-                </a:solidFill>
-                <a:latin typeface="Arial"/>
-                <a:ea typeface="DejaVu Sans"/>
-              </a:rPr>
-              <a:t>Demo or paper review of a Genomic data problems addressed using machine learning</a:t>
-            </a:r>
-            <a:endParaRPr b="0" lang="en-US" sz="2400" spc="-1" strike="noStrike">
-              <a:latin typeface="Arial"/>
-            </a:endParaRPr>
-          </a:p>
-          <a:p>
-            <a:pPr>
-              <a:lnSpc>
-                <a:spcPct val="100000"/>
-              </a:lnSpc>
-              <a:spcAft>
-                <a:spcPts val="1060"/>
-              </a:spcAft>
-            </a:pPr>
-            <a:endParaRPr b="0" lang="en-US" sz="2400" spc="-1" strike="noStrike">
-              <a:latin typeface="Arial"/>
-            </a:endParaRPr>
-          </a:p>
-          <a:p>
-            <a:pPr marL="432000" indent="-321840">
+            <a:pPr marL="432000" indent="-321120">
               <a:lnSpc>
                 <a:spcPct val="100000"/>
               </a:lnSpc>
@@ -5145,7 +5207,7 @@
         <p:spPr>
           <a:xfrm>
             <a:off x="1620000" y="216000"/>
-            <a:ext cx="8097840" cy="933840"/>
+            <a:ext cx="8097120" cy="933120"/>
           </a:xfrm>
           <a:prstGeom prst="rect">
             <a:avLst/>
@@ -5196,7 +5258,7 @@
         <p:spPr>
           <a:xfrm>
             <a:off x="1620000" y="1368000"/>
-            <a:ext cx="8097840" cy="3286080"/>
+            <a:ext cx="8097120" cy="3285360"/>
           </a:xfrm>
           <a:prstGeom prst="rect">
             <a:avLst/>
@@ -5405,7 +5467,7 @@
         <p:spPr>
           <a:xfrm>
             <a:off x="1620000" y="216000"/>
-            <a:ext cx="8097840" cy="933840"/>
+            <a:ext cx="8097120" cy="933120"/>
           </a:xfrm>
           <a:prstGeom prst="rect">
             <a:avLst/>
@@ -5456,7 +5518,7 @@
         <p:spPr>
           <a:xfrm>
             <a:off x="1620000" y="1368000"/>
-            <a:ext cx="8097840" cy="3286080"/>
+            <a:ext cx="8097120" cy="3285360"/>
           </a:xfrm>
           <a:prstGeom prst="rect">
             <a:avLst/>
@@ -5529,7 +5591,7 @@
             </a:endParaRPr>
           </a:p>
           <a:p>
-            <a:pPr marL="432000" indent="-321840">
+            <a:pPr marL="432000" indent="-321120">
               <a:lnSpc>
                 <a:spcPct val="100000"/>
               </a:lnSpc>
@@ -5617,7 +5679,7 @@
         <p:spPr>
           <a:xfrm>
             <a:off x="1620000" y="216000"/>
-            <a:ext cx="8097840" cy="933840"/>
+            <a:ext cx="8097120" cy="933120"/>
           </a:xfrm>
           <a:prstGeom prst="rect">
             <a:avLst/>
@@ -5678,7 +5740,7 @@
         <p:spPr>
           <a:xfrm>
             <a:off x="1620000" y="1368000"/>
-            <a:ext cx="8097840" cy="3286080"/>
+            <a:ext cx="8097120" cy="3285360"/>
           </a:xfrm>
           <a:prstGeom prst="rect">
             <a:avLst/>
@@ -5699,7 +5761,7 @@
             <a:normAutofit/>
           </a:bodyPr>
           <a:p>
-            <a:pPr marL="432000" indent="-321840">
+            <a:pPr marL="432000" indent="-321120">
               <a:lnSpc>
                 <a:spcPct val="100000"/>
               </a:lnSpc>
@@ -5741,7 +5803,7 @@
             </a:endParaRPr>
           </a:p>
           <a:p>
-            <a:pPr marL="432000" indent="-321840">
+            <a:pPr marL="432000" indent="-321120">
               <a:lnSpc>
                 <a:spcPct val="100000"/>
               </a:lnSpc>
@@ -5783,7 +5845,7 @@
             </a:endParaRPr>
           </a:p>
           <a:p>
-            <a:pPr marL="432000" indent="-321840">
+            <a:pPr marL="432000" indent="-321120">
               <a:lnSpc>
                 <a:spcPct val="100000"/>
               </a:lnSpc>
@@ -5825,7 +5887,7 @@
             </a:endParaRPr>
           </a:p>
           <a:p>
-            <a:pPr marL="432000" indent="-321840">
+            <a:pPr marL="432000" indent="-321120">
               <a:lnSpc>
                 <a:spcPct val="100000"/>
               </a:lnSpc>
@@ -5913,7 +5975,7 @@
         <p:spPr>
           <a:xfrm>
             <a:off x="1620000" y="216000"/>
-            <a:ext cx="8097840" cy="933840"/>
+            <a:ext cx="8097120" cy="933120"/>
           </a:xfrm>
           <a:prstGeom prst="rect">
             <a:avLst/>
@@ -5964,7 +6026,7 @@
         <p:spPr>
           <a:xfrm>
             <a:off x="1620000" y="1368000"/>
-            <a:ext cx="8097840" cy="3286080"/>
+            <a:ext cx="8097120" cy="3285360"/>
           </a:xfrm>
           <a:prstGeom prst="rect">
             <a:avLst/>
@@ -5985,7 +6047,7 @@
             <a:normAutofit/>
           </a:bodyPr>
           <a:p>
-            <a:pPr marL="432000" indent="-321840">
+            <a:pPr marL="432000" indent="-321120">
               <a:lnSpc>
                 <a:spcPct val="100000"/>
               </a:lnSpc>
@@ -6014,7 +6076,7 @@
             </a:endParaRPr>
           </a:p>
           <a:p>
-            <a:pPr lvl="4" marL="1080000" indent="-214200">
+            <a:pPr lvl="4" marL="1080000" indent="-213480">
               <a:lnSpc>
                 <a:spcPct val="100000"/>
               </a:lnSpc>
@@ -6043,7 +6105,7 @@
             </a:endParaRPr>
           </a:p>
           <a:p>
-            <a:pPr lvl="4" marL="1080000" indent="-214200">
+            <a:pPr lvl="4" marL="1080000" indent="-213480">
               <a:lnSpc>
                 <a:spcPct val="100000"/>
               </a:lnSpc>
@@ -6085,7 +6147,7 @@
             </a:endParaRPr>
           </a:p>
           <a:p>
-            <a:pPr marL="432000" indent="-321840">
+            <a:pPr marL="432000" indent="-321120">
               <a:lnSpc>
                 <a:spcPct val="100000"/>
               </a:lnSpc>
@@ -6127,7 +6189,7 @@
             </a:endParaRPr>
           </a:p>
           <a:p>
-            <a:pPr marL="432000" indent="-321840">
+            <a:pPr marL="432000" indent="-321120">
               <a:lnSpc>
                 <a:spcPct val="100000"/>
               </a:lnSpc>
@@ -6228,7 +6290,7 @@
         <p:spPr>
           <a:xfrm>
             <a:off x="1620000" y="216000"/>
-            <a:ext cx="8097840" cy="933840"/>
+            <a:ext cx="8097120" cy="933120"/>
           </a:xfrm>
           <a:prstGeom prst="rect">
             <a:avLst/>
@@ -6279,7 +6341,7 @@
         <p:spPr>
           <a:xfrm>
             <a:off x="1620000" y="1368000"/>
-            <a:ext cx="8097840" cy="3286080"/>
+            <a:ext cx="8097120" cy="3285360"/>
           </a:xfrm>
           <a:prstGeom prst="rect">
             <a:avLst/>
@@ -6300,7 +6362,7 @@
             <a:normAutofit/>
           </a:bodyPr>
           <a:p>
-            <a:pPr marL="432000" indent="-321840">
+            <a:pPr marL="432000" indent="-321120">
               <a:lnSpc>
                 <a:spcPct val="100000"/>
               </a:lnSpc>
@@ -6332,7 +6394,7 @@
                 <a:latin typeface="Arial"/>
                 <a:ea typeface="DejaVu Sans"/>
               </a:rPr>
-              <a:t>Doclets (JSDoc comment)- Describes an object </a:t>
+              <a:t>Doclet (JSDoc comment)- Describes an object </a:t>
             </a:r>
             <a:endParaRPr b="0" lang="en-US" sz="2400" spc="-1" strike="noStrike">
               <a:latin typeface="Arial"/>
@@ -6352,7 +6414,7 @@
             </a:endParaRPr>
           </a:p>
           <a:p>
-            <a:pPr marL="432000" indent="-321840">
+            <a:pPr marL="432000" indent="-321120">
               <a:lnSpc>
                 <a:spcPct val="100000"/>
               </a:lnSpc>
@@ -6394,7 +6456,7 @@
             </a:endParaRPr>
           </a:p>
           <a:p>
-            <a:pPr marL="432000" indent="-321840">
+            <a:pPr marL="432000" indent="-321120">
               <a:lnSpc>
                 <a:spcPct val="100000"/>
               </a:lnSpc>
@@ -6495,7 +6557,7 @@
         <p:spPr>
           <a:xfrm>
             <a:off x="1620000" y="216000"/>
-            <a:ext cx="8097840" cy="933840"/>
+            <a:ext cx="8097120" cy="933120"/>
           </a:xfrm>
           <a:prstGeom prst="rect">
             <a:avLst/>
@@ -6546,7 +6608,7 @@
         <p:spPr>
           <a:xfrm>
             <a:off x="1620000" y="1368000"/>
-            <a:ext cx="8097840" cy="3286080"/>
+            <a:ext cx="8097120" cy="3285360"/>
           </a:xfrm>
           <a:prstGeom prst="rect">
             <a:avLst/>
@@ -6567,7 +6629,7 @@
             <a:normAutofit/>
           </a:bodyPr>
           <a:p>
-            <a:pPr marL="432000" indent="-321840">
+            <a:pPr marL="432000" indent="-321120">
               <a:lnSpc>
                 <a:spcPct val="100000"/>
               </a:lnSpc>
@@ -6619,7 +6681,7 @@
             </a:endParaRPr>
           </a:p>
           <a:p>
-            <a:pPr marL="432000" indent="-321840">
+            <a:pPr marL="432000" indent="-321120">
               <a:lnSpc>
                 <a:spcPct val="100000"/>
               </a:lnSpc>
@@ -6661,7 +6723,7 @@
             </a:endParaRPr>
           </a:p>
           <a:p>
-            <a:pPr marL="432000" indent="-321840">
+            <a:pPr marL="432000" indent="-321120">
               <a:lnSpc>
                 <a:spcPct val="100000"/>
               </a:lnSpc>
@@ -6690,7 +6752,7 @@
             </a:endParaRPr>
           </a:p>
           <a:p>
-            <a:pPr lvl="1" marL="864000" indent="-321840">
+            <a:pPr lvl="1" marL="864000" indent="-321120">
               <a:lnSpc>
                 <a:spcPct val="100000"/>
               </a:lnSpc>
@@ -6852,7 +6914,7 @@
             </a:endParaRPr>
           </a:p>
           <a:p>
-            <a:pPr lvl="1" marL="864000" indent="-321840">
+            <a:pPr lvl="1" marL="864000" indent="-321120">
               <a:lnSpc>
                 <a:spcPct val="100000"/>
               </a:lnSpc>
@@ -6940,7 +7002,7 @@
         <p:spPr>
           <a:xfrm>
             <a:off x="1620000" y="216000"/>
-            <a:ext cx="8097840" cy="933840"/>
+            <a:ext cx="8097120" cy="933120"/>
           </a:xfrm>
           <a:prstGeom prst="rect">
             <a:avLst/>
@@ -6991,7 +7053,7 @@
         <p:spPr>
           <a:xfrm>
             <a:off x="1620000" y="1368000"/>
-            <a:ext cx="8097840" cy="3286080"/>
+            <a:ext cx="8097120" cy="3285360"/>
           </a:xfrm>
           <a:prstGeom prst="rect">
             <a:avLst/>
@@ -7012,7 +7074,7 @@
             <a:normAutofit/>
           </a:bodyPr>
           <a:p>
-            <a:pPr marL="432000" indent="-321840">
+            <a:pPr marL="432000" indent="-321120">
               <a:lnSpc>
                 <a:spcPct val="100000"/>
               </a:lnSpc>
@@ -7064,7 +7126,7 @@
             </a:endParaRPr>
           </a:p>
           <a:p>
-            <a:pPr marL="432000" indent="-321840">
+            <a:pPr marL="432000" indent="-321120">
               <a:lnSpc>
                 <a:spcPct val="100000"/>
               </a:lnSpc>
@@ -7136,7 +7198,7 @@
             </a:endParaRPr>
           </a:p>
           <a:p>
-            <a:pPr marL="432000" indent="-321840">
+            <a:pPr marL="432000" indent="-321120">
               <a:lnSpc>
                 <a:spcPct val="100000"/>
               </a:lnSpc>
@@ -7165,7 +7227,7 @@
             </a:endParaRPr>
           </a:p>
           <a:p>
-            <a:pPr lvl="2" marL="648000" indent="-214200">
+            <a:pPr lvl="2" marL="648000" indent="-213480">
               <a:lnSpc>
                 <a:spcPct val="100000"/>
               </a:lnSpc>
@@ -7253,7 +7315,7 @@
         <p:spPr>
           <a:xfrm>
             <a:off x="1620000" y="216000"/>
-            <a:ext cx="8097840" cy="933840"/>
+            <a:ext cx="8097120" cy="933120"/>
           </a:xfrm>
           <a:prstGeom prst="rect">
             <a:avLst/>
@@ -7304,7 +7366,7 @@
         <p:spPr>
           <a:xfrm>
             <a:off x="1620000" y="1368000"/>
-            <a:ext cx="8097840" cy="3286080"/>
+            <a:ext cx="8097120" cy="3285360"/>
           </a:xfrm>
           <a:prstGeom prst="rect">
             <a:avLst/>
@@ -7325,7 +7387,7 @@
             <a:normAutofit/>
           </a:bodyPr>
           <a:p>
-            <a:pPr marL="432000" indent="-321840">
+            <a:pPr marL="432000" indent="-321120">
               <a:lnSpc>
                 <a:spcPct val="100000"/>
               </a:lnSpc>
@@ -7367,7 +7429,7 @@
             </a:endParaRPr>
           </a:p>
           <a:p>
-            <a:pPr marL="432000" indent="-321840">
+            <a:pPr marL="432000" indent="-321120">
               <a:lnSpc>
                 <a:spcPct val="100000"/>
               </a:lnSpc>
@@ -7409,7 +7471,7 @@
             </a:endParaRPr>
           </a:p>
           <a:p>
-            <a:pPr marL="432000" indent="-321840">
+            <a:pPr marL="432000" indent="-321120">
               <a:lnSpc>
                 <a:spcPct val="100000"/>
               </a:lnSpc>
@@ -7510,7 +7572,7 @@
         <p:spPr>
           <a:xfrm>
             <a:off x="1620000" y="216000"/>
-            <a:ext cx="8097840" cy="933840"/>
+            <a:ext cx="8097120" cy="933120"/>
           </a:xfrm>
           <a:prstGeom prst="rect">
             <a:avLst/>
@@ -7561,7 +7623,7 @@
         <p:spPr>
           <a:xfrm>
             <a:off x="1620000" y="1368000"/>
-            <a:ext cx="8097840" cy="3286080"/>
+            <a:ext cx="8097120" cy="3285360"/>
           </a:xfrm>
           <a:prstGeom prst="rect">
             <a:avLst/>
@@ -7582,7 +7644,7 @@
             <a:normAutofit/>
           </a:bodyPr>
           <a:p>
-            <a:pPr marL="432000" indent="-321840">
+            <a:pPr marL="432000" indent="-321120">
               <a:lnSpc>
                 <a:spcPct val="100000"/>
               </a:lnSpc>
@@ -7604,6 +7666,54 @@
                 <a:latin typeface="Arial"/>
                 <a:ea typeface="DejaVu Sans"/>
               </a:rPr>
+              <a:t>Extremely trivial virtual world, with a cow</a:t>
+            </a:r>
+            <a:endParaRPr b="0" lang="en-US" sz="2400" spc="-1" strike="noStrike">
+              <a:latin typeface="Arial"/>
+            </a:endParaRPr>
+          </a:p>
+          <a:p>
+            <a:pPr marL="432000" indent="-321120">
+              <a:lnSpc>
+                <a:spcPct val="100000"/>
+              </a:lnSpc>
+              <a:spcAft>
+                <a:spcPts val="1060"/>
+              </a:spcAft>
+              <a:buClr>
+                <a:srgbClr val="0066ff"/>
+              </a:buClr>
+              <a:buSzPct val="40000"/>
+              <a:buFont typeface="Wingdings" charset="2"/>
+              <a:buChar char=""/>
+            </a:pPr>
+            <a:endParaRPr b="0" lang="en-US" sz="2400" spc="-1" strike="noStrike">
+              <a:latin typeface="Arial"/>
+            </a:endParaRPr>
+          </a:p>
+          <a:p>
+            <a:pPr marL="432000" indent="-321120">
+              <a:lnSpc>
+                <a:spcPct val="100000"/>
+              </a:lnSpc>
+              <a:spcAft>
+                <a:spcPts val="1060"/>
+              </a:spcAft>
+              <a:buClr>
+                <a:srgbClr val="0066ff"/>
+              </a:buClr>
+              <a:buSzPct val="40000"/>
+              <a:buFont typeface="Wingdings" charset="2"/>
+              <a:buChar char=""/>
+            </a:pPr>
+            <a:r>
+              <a:rPr b="0" lang="en-US" sz="2400" spc="-1" strike="noStrike">
+                <a:solidFill>
+                  <a:srgbClr val="050505"/>
+                </a:solidFill>
+                <a:latin typeface="Arial"/>
+                <a:ea typeface="DejaVu Sans"/>
+              </a:rPr>
               <a:t>Using Visual code Packages/Plugin</a:t>
             </a:r>
             <a:endParaRPr b="0" lang="en-US" sz="2400" spc="-1" strike="noStrike">
@@ -7611,7 +7721,7 @@
             </a:endParaRPr>
           </a:p>
           <a:p>
-            <a:pPr lvl="1" marL="864000" indent="-321840">
+            <a:pPr lvl="1" marL="864000" indent="-321120">
               <a:lnSpc>
                 <a:spcPct val="100000"/>
               </a:lnSpc>
@@ -7640,7 +7750,7 @@
             </a:endParaRPr>
           </a:p>
           <a:p>
-            <a:pPr lvl="1" marL="864000" indent="-321840">
+            <a:pPr lvl="1" marL="864000" indent="-321120">
               <a:lnSpc>
                 <a:spcPct val="100000"/>
               </a:lnSpc>
@@ -7682,49 +7792,7 @@
             </a:endParaRPr>
           </a:p>
           <a:p>
-            <a:pPr marL="432000" indent="-321840">
-              <a:lnSpc>
-                <a:spcPct val="100000"/>
-              </a:lnSpc>
-              <a:spcAft>
-                <a:spcPts val="1060"/>
-              </a:spcAft>
-              <a:buClr>
-                <a:srgbClr val="0066ff"/>
-              </a:buClr>
-              <a:buSzPct val="40000"/>
-              <a:buFont typeface="Wingdings" charset="2"/>
-              <a:buChar char=""/>
-            </a:pPr>
-            <a:r>
-              <a:rPr b="0" lang="en-US" sz="2400" spc="-1" strike="noStrike">
-                <a:solidFill>
-                  <a:srgbClr val="050505"/>
-                </a:solidFill>
-                <a:latin typeface="Arial"/>
-                <a:ea typeface="DejaVu Sans"/>
-              </a:rPr>
-              <a:t>Good chance other editors have equivalent packages</a:t>
-            </a:r>
-            <a:endParaRPr b="0" lang="en-US" sz="2400" spc="-1" strike="noStrike">
-              <a:latin typeface="Arial"/>
-            </a:endParaRPr>
-          </a:p>
-          <a:p>
-            <a:pPr>
-              <a:lnSpc>
-                <a:spcPct val="100000"/>
-              </a:lnSpc>
-              <a:spcAft>
-                <a:spcPts val="1060"/>
-              </a:spcAft>
-            </a:pPr>
-            <a:endParaRPr b="0" lang="en-US" sz="2400" spc="-1" strike="noStrike">
-              <a:latin typeface="Arial"/>
-            </a:endParaRPr>
-          </a:p>
-          <a:p>
-            <a:pPr marL="432000" indent="-321840">
+            <a:pPr marL="432000" indent="-321120">
               <a:lnSpc>
                 <a:spcPct val="100000"/>
               </a:lnSpc>
@@ -7858,7 +7926,7 @@
         <p:spPr>
           <a:xfrm>
             <a:off x="1620000" y="216000"/>
-            <a:ext cx="8097840" cy="933840"/>
+            <a:ext cx="8097120" cy="933120"/>
           </a:xfrm>
           <a:prstGeom prst="rect">
             <a:avLst/>
@@ -7909,7 +7977,7 @@
         <p:spPr>
           <a:xfrm>
             <a:off x="1620000" y="1368000"/>
-            <a:ext cx="8097840" cy="3286080"/>
+            <a:ext cx="8097120" cy="3285360"/>
           </a:xfrm>
           <a:prstGeom prst="rect">
             <a:avLst/>
@@ -7930,7 +7998,7 @@
             <a:normAutofit/>
           </a:bodyPr>
           <a:p>
-            <a:pPr marL="432000" indent="-321840">
+            <a:pPr marL="432000" indent="-321120">
               <a:lnSpc>
                 <a:spcPct val="100000"/>
               </a:lnSpc>
@@ -7959,7 +8027,7 @@
             </a:endParaRPr>
           </a:p>
           <a:p>
-            <a:pPr marL="432000" indent="-321840">
+            <a:pPr marL="432000" indent="-321120">
               <a:lnSpc>
                 <a:spcPct val="100000"/>
               </a:lnSpc>
@@ -7988,7 +8056,7 @@
             </a:endParaRPr>
           </a:p>
           <a:p>
-            <a:pPr marL="432000" indent="-321840">
+            <a:pPr marL="432000" indent="-321120">
               <a:lnSpc>
                 <a:spcPct val="100000"/>
               </a:lnSpc>
@@ -8010,14 +8078,14 @@
                 <a:latin typeface="Arial"/>
                 <a:ea typeface="DejaVu Sans"/>
               </a:rPr>
-              <a:t>Many tags not covered</a:t>
+              <a:t>There are many tags</a:t>
             </a:r>
             <a:endParaRPr b="0" lang="en-US" sz="2400" spc="-1" strike="noStrike">
               <a:latin typeface="Arial"/>
             </a:endParaRPr>
           </a:p>
           <a:p>
-            <a:pPr marL="432000" indent="-321840">
+            <a:pPr marL="432000" indent="-321120">
               <a:lnSpc>
                 <a:spcPct val="100000"/>
               </a:lnSpc>
@@ -8046,7 +8114,7 @@
             </a:endParaRPr>
           </a:p>
           <a:p>
-            <a:pPr marL="432000" indent="-321840">
+            <a:pPr marL="432000" indent="-321120">
               <a:lnSpc>
                 <a:spcPct val="100000"/>
               </a:lnSpc>
@@ -8075,7 +8143,7 @@
             </a:endParaRPr>
           </a:p>
           <a:p>
-            <a:pPr lvl="1" marL="864000" indent="-321840">
+            <a:pPr lvl="1" marL="864000" indent="-321120">
               <a:lnSpc>
                 <a:spcPct val="100000"/>
               </a:lnSpc>
@@ -8104,7 +8172,7 @@
             </a:endParaRPr>
           </a:p>
           <a:p>
-            <a:pPr lvl="1" marL="864000" indent="-321840">
+            <a:pPr lvl="1" marL="864000" indent="-321120">
               <a:lnSpc>
                 <a:spcPct val="100000"/>
               </a:lnSpc>

</xml_diff>